<commit_message>
changed a few slides
</commit_message>
<xml_diff>
--- a/gitHub_class.pptx
+++ b/gitHub_class.pptx
@@ -5,7 +5,7 @@
     <p:sldMasterId id="2147483648" r:id="rId1"/>
   </p:sldMasterIdLst>
   <p:notesMasterIdLst>
-    <p:notesMasterId r:id="rId39"/>
+    <p:notesMasterId r:id="rId40"/>
   </p:notesMasterIdLst>
   <p:sldIdLst>
     <p:sldId id="256" r:id="rId2"/>
@@ -37,14 +37,15 @@
     <p:sldId id="301" r:id="rId28"/>
     <p:sldId id="297" r:id="rId29"/>
     <p:sldId id="293" r:id="rId30"/>
-    <p:sldId id="295" r:id="rId31"/>
-    <p:sldId id="306" r:id="rId32"/>
-    <p:sldId id="302" r:id="rId33"/>
+    <p:sldId id="302" r:id="rId31"/>
+    <p:sldId id="295" r:id="rId32"/>
+    <p:sldId id="306" r:id="rId33"/>
     <p:sldId id="305" r:id="rId34"/>
     <p:sldId id="304" r:id="rId35"/>
     <p:sldId id="303" r:id="rId36"/>
     <p:sldId id="307" r:id="rId37"/>
-    <p:sldId id="308" r:id="rId38"/>
+    <p:sldId id="313" r:id="rId38"/>
+    <p:sldId id="308" r:id="rId39"/>
   </p:sldIdLst>
   <p:sldSz cx="12192000" cy="6858000"/>
   <p:notesSz cx="6858000" cy="9144000"/>
@@ -568,11 +569,7 @@
             </a:r>
             <a:r>
               <a:rPr lang="en-US" baseline="0" dirty="0" smtClean="0"/>
-              <a:t>  I would also like to go around the room and have you say your name, and a few things you are hoping to get out of the class. </a:t>
-            </a:r>
-            <a:r>
-              <a:rPr lang="en-US" baseline="0" dirty="0" smtClean="0"/>
-              <a:t>Please don’t hesitate to ask questions at any time during the class.  If you are confused, then someone else probably is too.  That goes double if I use a term that you don’t understand.  I will be using a lot of jargon, forking, cloning, and repo.  It’s important understand these terms, but it can be hard to keep them all straight.  I am always going to try to define terms that are specific to GitHub, but I might miss some.  So again, please don’t hesitate to ask questions. </a:t>
+              <a:t>  I would also like to go around the room and have you say your name, and a few things you are hoping to get out of the class. Please don’t hesitate to ask questions at any time during the class.  If you are confused, then someone else probably is too.  That goes double if I use a term that you don’t understand.  I will be using a lot of jargon, forking, cloning, and repo.  It’s important understand these terms, but it can be hard to keep them all straight.  I am always going to try to define terms that are specific to GitHub, but I might miss some.  So again, please don’t hesitate to ask questions. </a:t>
             </a:r>
           </a:p>
           <a:p>
@@ -670,11 +667,7 @@
             </a:r>
             <a:r>
               <a:rPr lang="en-US" baseline="0" dirty="0" smtClean="0"/>
-              <a:t> “snapshots” of </a:t>
-            </a:r>
-            <a:r>
-              <a:rPr lang="en-US" baseline="0" dirty="0" smtClean="0"/>
-              <a:t>the entire </a:t>
+              <a:t> “snapshots” of the entire </a:t>
             </a:r>
             <a:r>
               <a:rPr lang="en-US" baseline="0" dirty="0" err="1" smtClean="0"/>
@@ -716,11 +709,7 @@
             </a:r>
             <a:r>
               <a:rPr lang="en-US" baseline="0" dirty="0" smtClean="0"/>
-              <a:t> uses this “snapshot” system, once a commit is made, you can most likely get back to previous snapshots.  The in-between states, when files are staged or modified, those files are not in any snapshot.  so </a:t>
-            </a:r>
-            <a:r>
-              <a:rPr lang="en-US" baseline="0" dirty="0" smtClean="0"/>
-              <a:t> you need to be careful.  Those are the places you might lose information.</a:t>
+              <a:t> uses this “snapshot” system, once a commit is made, you can most likely get back to previous snapshots.  The in-between states, when files are staged or modified, those files are not in any snapshot.  so  you need to be careful.  Those are the places you might lose information.</a:t>
             </a:r>
             <a:endParaRPr lang="en-US" dirty="0"/>
           </a:p>
@@ -1352,15 +1341,7 @@
             </a:r>
             <a:r>
               <a:rPr lang="en-US" baseline="0" dirty="0" smtClean="0"/>
-              <a:t> into how branching works, I just want to talk about how using branching is a little different.  The </a:t>
-            </a:r>
-            <a:r>
-              <a:rPr lang="en-US" baseline="0" dirty="0" smtClean="0"/>
-              <a:t>first figure </a:t>
-            </a:r>
-            <a:r>
-              <a:rPr lang="en-US" baseline="0" dirty="0" smtClean="0"/>
-              <a:t>is how a lot of projects go, with important advances in the project being saved, “somewhere safe”, but there are a lot of different version between those milestones.  In </a:t>
+              <a:t> into how branching works, I just want to talk about how using branching is a little different.  The first figure is how a lot of projects go, with important advances in the project being saved, “somewhere safe”, but there are a lot of different version between those milestones.  In </a:t>
             </a:r>
             <a:r>
               <a:rPr lang="en-US" baseline="0" dirty="0" err="1" smtClean="0"/>
@@ -1368,15 +1349,7 @@
             </a:r>
             <a:r>
               <a:rPr lang="en-US" baseline="0" dirty="0" smtClean="0"/>
-              <a:t>, if you have a working version or an important advance and you don’t want to mess it up, you can make a </a:t>
-            </a:r>
-            <a:r>
-              <a:rPr lang="en-US" baseline="0" dirty="0" smtClean="0"/>
-              <a:t>branch to start working on a different problem.  </a:t>
-            </a:r>
-            <a:r>
-              <a:rPr lang="en-US" baseline="0" dirty="0" smtClean="0"/>
-              <a:t>This branch is basically a copy. However, I want to be clear </a:t>
+              <a:t>, if you have a working version or an important advance and you don’t want to mess it up, you can make a branch to start working on a different problem.  This branch is basically a copy. However, I want to be clear </a:t>
             </a:r>
             <a:r>
               <a:rPr lang="en-US" baseline="0" dirty="0" err="1" smtClean="0"/>
@@ -1490,11 +1463,7 @@
             </a:r>
             <a:r>
               <a:rPr lang="en-US" baseline="0" dirty="0" smtClean="0"/>
-              <a:t> to that </a:t>
-            </a:r>
-            <a:r>
-              <a:rPr lang="en-US" baseline="0" dirty="0" smtClean="0"/>
-              <a:t>branch</a:t>
+              <a:t> to that branch</a:t>
             </a:r>
           </a:p>
           <a:p>
@@ -1508,7 +1477,6 @@
               <a:rPr lang="en-US" baseline="0" dirty="0" smtClean="0"/>
               <a:t>.</a:t>
             </a:r>
-            <a:endParaRPr lang="en-US" baseline="0" dirty="0" smtClean="0"/>
           </a:p>
           <a:p>
             <a:endParaRPr lang="en-US" dirty="0"/>
@@ -1601,11 +1569,7 @@
             </a:r>
             <a:r>
               <a:rPr lang="en-US" baseline="0" dirty="0" smtClean="0"/>
-              <a:t> to that </a:t>
-            </a:r>
-            <a:r>
-              <a:rPr lang="en-US" baseline="0" dirty="0" smtClean="0"/>
-              <a:t>branch</a:t>
+              <a:t> to that branch</a:t>
             </a:r>
           </a:p>
           <a:p>
@@ -1617,11 +1581,7 @@
           <a:p>
             <a:r>
               <a:rPr lang="en-US" dirty="0" smtClean="0"/>
-              <a:t>So </a:t>
-            </a:r>
-            <a:r>
-              <a:rPr lang="en-US" dirty="0" smtClean="0"/>
-              <a:t>now</a:t>
+              <a:t>So now</a:t>
             </a:r>
             <a:r>
               <a:rPr lang="en-US" baseline="0" dirty="0" smtClean="0"/>
@@ -1742,11 +1702,7 @@
           <a:p>
             <a:r>
               <a:rPr lang="en-US" baseline="0" dirty="0" smtClean="0"/>
-              <a:t>Sometimes merge conflicts happen when you are working with other people, and I will talk about </a:t>
-            </a:r>
-            <a:r>
-              <a:rPr lang="en-US" baseline="0" dirty="0" smtClean="0"/>
-              <a:t>that when we talk about GitHub</a:t>
+              <a:t>Sometimes merge conflicts happen when you are working with other people, and I will talk about that when we talk about GitHub</a:t>
             </a:r>
             <a:endParaRPr lang="en-US" dirty="0"/>
           </a:p>
@@ -2272,11 +2228,7 @@
           <a:p>
             <a:r>
               <a:rPr lang="en-US" baseline="0" dirty="0" smtClean="0"/>
-              <a:t>And make sure you initialize with a </a:t>
-            </a:r>
-            <a:r>
-              <a:rPr lang="en-US" baseline="0" dirty="0" smtClean="0"/>
-              <a:t>README</a:t>
+              <a:t>And make sure you initialize with a README</a:t>
             </a:r>
           </a:p>
           <a:p>
@@ -2562,11 +2514,11 @@
           <a:p>
             <a:r>
               <a:rPr lang="en-US" dirty="0" smtClean="0"/>
-              <a:t>Before</a:t>
+              <a:t>This is how you clone a local</a:t>
             </a:r>
             <a:r>
               <a:rPr lang="en-US" baseline="0" dirty="0" smtClean="0"/>
-              <a:t> we get to far into GitHub, I wanted to show you what the workflow when collaborating with GitHub looks like.  </a:t>
+              <a:t> copy of any repo on GitHub into your hard drive.  This includes your own repos.  </a:t>
             </a:r>
             <a:endParaRPr lang="en-US" dirty="0"/>
           </a:p>
@@ -2598,7 +2550,7 @@
     </p:spTree>
     <p:extLst>
       <p:ext uri="{BB962C8B-B14F-4D97-AF65-F5344CB8AC3E}">
-        <p14:creationId xmlns:p14="http://schemas.microsoft.com/office/powerpoint/2010/main" val="3760165828"/>
+        <p14:creationId xmlns:p14="http://schemas.microsoft.com/office/powerpoint/2010/main" val="1105838842"/>
       </p:ext>
     </p:extLst>
   </p:cSld>
@@ -2654,14 +2606,12 @@
           <a:p>
             <a:r>
               <a:rPr lang="en-US" dirty="0" smtClean="0"/>
-              <a:t>Make sure you are in the</a:t>
+              <a:t>Before</a:t>
             </a:r>
             <a:r>
               <a:rPr lang="en-US" baseline="0" dirty="0" smtClean="0"/>
-              <a:t> right directory.  You might need to use the cd command.</a:t>
-            </a:r>
-          </a:p>
-          <a:p>
+              <a:t> we get to far into GitHub, I wanted to show you what the workflow when collaborating with GitHub looks like.  </a:t>
+            </a:r>
             <a:endParaRPr lang="en-US" dirty="0"/>
           </a:p>
         </p:txBody>
@@ -2692,7 +2642,7 @@
     </p:spTree>
     <p:extLst>
       <p:ext uri="{BB962C8B-B14F-4D97-AF65-F5344CB8AC3E}">
-        <p14:creationId xmlns:p14="http://schemas.microsoft.com/office/powerpoint/2010/main" val="3951250074"/>
+        <p14:creationId xmlns:p14="http://schemas.microsoft.com/office/powerpoint/2010/main" val="3760165828"/>
       </p:ext>
     </p:extLst>
   </p:cSld>
@@ -2748,12 +2698,14 @@
           <a:p>
             <a:r>
               <a:rPr lang="en-US" dirty="0" smtClean="0"/>
-              <a:t>This is how you clone a local</a:t>
+              <a:t>Make sure you are in the</a:t>
             </a:r>
             <a:r>
               <a:rPr lang="en-US" baseline="0" dirty="0" smtClean="0"/>
-              <a:t> copy of any repo on GitHub into your hard drive.  This includes your own repos.  </a:t>
-            </a:r>
+              <a:t> right directory.  You might need to use the cd command.</a:t>
+            </a:r>
+          </a:p>
+          <a:p>
             <a:endParaRPr lang="en-US" dirty="0"/>
           </a:p>
         </p:txBody>
@@ -2784,7 +2736,7 @@
     </p:spTree>
     <p:extLst>
       <p:ext uri="{BB962C8B-B14F-4D97-AF65-F5344CB8AC3E}">
-        <p14:creationId xmlns:p14="http://schemas.microsoft.com/office/powerpoint/2010/main" val="1105838842"/>
+        <p14:creationId xmlns:p14="http://schemas.microsoft.com/office/powerpoint/2010/main" val="3951250074"/>
       </p:ext>
     </p:extLst>
   </p:cSld>
@@ -3067,15 +3019,7 @@
             </a:r>
             <a:r>
               <a:rPr lang="en-US" baseline="0" dirty="0" smtClean="0"/>
-              <a:t> can be used with private servers too.  </a:t>
-            </a:r>
-            <a:r>
-              <a:rPr lang="en-US" baseline="0" dirty="0" smtClean="0"/>
-              <a:t>At this point you  </a:t>
-            </a:r>
-            <a:r>
-              <a:rPr lang="en-US" baseline="0" dirty="0" smtClean="0"/>
-              <a:t>When we click on the green button, a pull request opens.  This is where we describe the changes we made.   When we are working with other people, the better this is filled out, the more likely the request will be accepted.</a:t>
+              <a:t> can be used with private servers too.  At this point you  When we click on the green button, a pull request opens.  This is where we describe the changes we made.   When we are working with other people, the better this is filled out, the more likely the request will be accepted.</a:t>
             </a:r>
             <a:endParaRPr lang="en-US" dirty="0"/>
           </a:p>
@@ -3367,6 +3311,90 @@
 </p:notes>
 </file>
 
+<file path=ppt/notesSlides/notesSlide33.xml><?xml version="1.0" encoding="utf-8"?>
+<p:notes xmlns:a="http://schemas.openxmlformats.org/drawingml/2006/main" xmlns:r="http://schemas.openxmlformats.org/officeDocument/2006/relationships" xmlns:p="http://schemas.openxmlformats.org/presentationml/2006/main">
+  <p:cSld>
+    <p:spTree>
+      <p:nvGrpSpPr>
+        <p:cNvPr id="1" name=""/>
+        <p:cNvGrpSpPr/>
+        <p:nvPr/>
+      </p:nvGrpSpPr>
+      <p:grpSpPr>
+        <a:xfrm>
+          <a:off x="0" y="0"/>
+          <a:ext cx="0" cy="0"/>
+          <a:chOff x="0" y="0"/>
+          <a:chExt cx="0" cy="0"/>
+        </a:xfrm>
+      </p:grpSpPr>
+      <p:sp>
+        <p:nvSpPr>
+          <p:cNvPr id="2" name="Slide Image Placeholder 1"/>
+          <p:cNvSpPr>
+            <a:spLocks noGrp="1" noRot="1" noChangeAspect="1"/>
+          </p:cNvSpPr>
+          <p:nvPr>
+            <p:ph type="sldImg"/>
+          </p:nvPr>
+        </p:nvSpPr>
+        <p:spPr/>
+      </p:sp>
+      <p:sp>
+        <p:nvSpPr>
+          <p:cNvPr id="3" name="Notes Placeholder 2"/>
+          <p:cNvSpPr>
+            <a:spLocks noGrp="1"/>
+          </p:cNvSpPr>
+          <p:nvPr>
+            <p:ph type="body" idx="1"/>
+          </p:nvPr>
+        </p:nvSpPr>
+        <p:spPr/>
+        <p:txBody>
+          <a:bodyPr/>
+          <a:lstStyle/>
+          <a:p>
+            <a:endParaRPr lang="en-US" dirty="0"/>
+          </a:p>
+        </p:txBody>
+      </p:sp>
+      <p:sp>
+        <p:nvSpPr>
+          <p:cNvPr id="4" name="Slide Number Placeholder 3"/>
+          <p:cNvSpPr>
+            <a:spLocks noGrp="1"/>
+          </p:cNvSpPr>
+          <p:nvPr>
+            <p:ph type="sldNum" sz="quarter" idx="10"/>
+          </p:nvPr>
+        </p:nvSpPr>
+        <p:spPr/>
+        <p:txBody>
+          <a:bodyPr/>
+          <a:lstStyle/>
+          <a:p>
+            <a:fld id="{C4CABDE8-4EE3-4FC7-944A-F87660CC93A0}" type="slidenum">
+              <a:rPr lang="en-US" smtClean="0"/>
+              <a:t>37</a:t>
+            </a:fld>
+            <a:endParaRPr lang="en-US"/>
+          </a:p>
+        </p:txBody>
+      </p:sp>
+    </p:spTree>
+    <p:extLst>
+      <p:ext uri="{BB962C8B-B14F-4D97-AF65-F5344CB8AC3E}">
+        <p14:creationId xmlns:p14="http://schemas.microsoft.com/office/powerpoint/2010/main" val="783111993"/>
+      </p:ext>
+    </p:extLst>
+  </p:cSld>
+  <p:clrMapOvr>
+    <a:masterClrMapping/>
+  </p:clrMapOvr>
+</p:notes>
+</file>
+
 <file path=ppt/notesSlides/notesSlide4.xml><?xml version="1.0" encoding="utf-8"?>
 <p:notes xmlns:a="http://schemas.openxmlformats.org/drawingml/2006/main" xmlns:r="http://schemas.openxmlformats.org/officeDocument/2006/relationships" xmlns:p="http://schemas.openxmlformats.org/presentationml/2006/main">
   <p:cSld>
@@ -3551,15 +3579,7 @@
             </a:r>
             <a:r>
               <a:rPr lang="en-US" baseline="0" dirty="0" smtClean="0"/>
-              <a:t> </a:t>
-            </a:r>
-            <a:r>
-              <a:rPr lang="en-US" baseline="0" dirty="0" smtClean="0"/>
-              <a:t>most of us are using different editors,  I’m not going to include them for this class.  I just wanted to  make you aware, you </a:t>
-            </a:r>
-            <a:r>
-              <a:rPr lang="en-US" baseline="0" dirty="0" smtClean="0"/>
-              <a:t>can and should set </a:t>
+              <a:t> most of us are using different editors,  I’m not going to include them for this class.  I just wanted to  make you aware, you can and should set </a:t>
             </a:r>
             <a:r>
               <a:rPr lang="en-US" baseline="0" dirty="0" err="1" smtClean="0"/>
@@ -3567,17 +3587,8 @@
             </a:r>
             <a:r>
               <a:rPr lang="en-US" baseline="0" dirty="0" smtClean="0"/>
-              <a:t> to </a:t>
-            </a:r>
-            <a:r>
-              <a:rPr lang="en-US" baseline="0" dirty="0" smtClean="0"/>
-              <a:t>use </a:t>
-            </a:r>
-            <a:r>
-              <a:rPr lang="en-US" baseline="0" dirty="0" smtClean="0"/>
-              <a:t>one.   </a:t>
-            </a:r>
-            <a:endParaRPr lang="en-US" baseline="0" dirty="0" smtClean="0"/>
+              <a:t> to use one.   </a:t>
+            </a:r>
           </a:p>
           <a:p>
             <a:r>
@@ -3835,19 +3846,7 @@
           <a:p>
             <a:r>
               <a:rPr lang="en-US" dirty="0" smtClean="0"/>
-              <a:t>You </a:t>
-            </a:r>
-            <a:r>
-              <a:rPr lang="en-US" dirty="0" smtClean="0"/>
-              <a:t>should </a:t>
-            </a:r>
-            <a:r>
-              <a:rPr lang="en-US" dirty="0" smtClean="0"/>
-              <a:t>see your </a:t>
-            </a:r>
-            <a:r>
-              <a:rPr lang="en-US" dirty="0" smtClean="0"/>
-              <a:t>two files under the Untracked heading.  Now before</a:t>
+              <a:t>You should see your two files under the Untracked heading.  Now before</a:t>
             </a:r>
             <a:r>
               <a:rPr lang="en-US" baseline="0" dirty="0" smtClean="0"/>
@@ -4023,15 +4022,7 @@
             </a:pPr>
             <a:r>
               <a:rPr lang="en-US" baseline="0" dirty="0" smtClean="0"/>
-              <a:t>Once it is in the staging area, it can then be committed.  I’ll talk more about commit, but the quick version is, once a file has been </a:t>
-            </a:r>
-            <a:r>
-              <a:rPr lang="en-US" baseline="0" dirty="0" smtClean="0"/>
-              <a:t>committed, </a:t>
-            </a:r>
-            <a:r>
-              <a:rPr lang="en-US" baseline="0" dirty="0" smtClean="0"/>
-              <a:t>there is almost always a way to get back to that version of the file.   </a:t>
+              <a:t>Once it is in the staging area, it can then be committed.  I’ll talk more about commit, but the quick version is, once a file has been committed, there is almost always a way to get back to that version of the file.   </a:t>
             </a:r>
           </a:p>
           <a:p>
@@ -4113,15 +4104,7 @@
             </a:r>
             <a:r>
               <a:rPr lang="en-US" baseline="0" dirty="0" smtClean="0"/>
-              <a:t> will mark it as modified.  So you can see the files you need </a:t>
-            </a:r>
-            <a:r>
-              <a:rPr lang="en-US" baseline="0" dirty="0" smtClean="0"/>
-              <a:t>to stage and </a:t>
-            </a:r>
-            <a:r>
-              <a:rPr lang="en-US" baseline="0" dirty="0" smtClean="0"/>
-              <a:t>commit.</a:t>
+              <a:t> will mark it as modified.  So you can see the files you need to stage and commit.</a:t>
             </a:r>
           </a:p>
           <a:p>
@@ -4251,11 +4234,7 @@
           <a:p>
             <a:r>
               <a:rPr lang="en-US" baseline="0" dirty="0" smtClean="0"/>
-              <a:t>We </a:t>
-            </a:r>
-            <a:r>
-              <a:rPr lang="en-US" baseline="0" dirty="0" smtClean="0"/>
-              <a:t>can then use the </a:t>
+              <a:t>We can then use the </a:t>
             </a:r>
             <a:r>
               <a:rPr lang="en-US" baseline="0" dirty="0" err="1" smtClean="0"/>
@@ -4263,15 +4242,7 @@
             </a:r>
             <a:r>
               <a:rPr lang="en-US" baseline="0" dirty="0" smtClean="0"/>
-              <a:t> add command for </a:t>
-            </a:r>
-            <a:r>
-              <a:rPr lang="en-US" baseline="0" dirty="0" smtClean="0"/>
-              <a:t>the two untracked files, </a:t>
-            </a:r>
-            <a:r>
-              <a:rPr lang="en-US" baseline="0" dirty="0" smtClean="0"/>
-              <a:t>which both adds the files to the staging area, and tells </a:t>
+              <a:t> add command for the two untracked files, which both adds the files to the staging area, and tells </a:t>
             </a:r>
             <a:r>
               <a:rPr lang="en-US" baseline="0" dirty="0" err="1" smtClean="0"/>
@@ -4307,15 +4278,7 @@
             </a:r>
             <a:r>
               <a:rPr lang="en-US" baseline="0" dirty="0" smtClean="0"/>
-              <a:t> will open your editor and </a:t>
-            </a:r>
-            <a:r>
-              <a:rPr lang="en-US" baseline="0" dirty="0" smtClean="0"/>
-              <a:t>you have to </a:t>
-            </a:r>
-            <a:r>
-              <a:rPr lang="en-US" baseline="0" dirty="0" smtClean="0"/>
-              <a:t>make the commit message there.  How that works depends on your editor, so for now we are going to add the message in the </a:t>
+              <a:t> will open your editor and you have to make the commit message there.  How that works depends on your editor, so for now we are going to add the message in the </a:t>
             </a:r>
             <a:r>
               <a:rPr lang="en-US" baseline="0" dirty="0" err="1" smtClean="0"/>
@@ -4339,11 +4302,7 @@
             </a:r>
             <a:r>
               <a:rPr lang="en-US" baseline="0" dirty="0" smtClean="0"/>
-              <a:t> status command again</a:t>
-            </a:r>
-            <a:r>
-              <a:rPr lang="en-US" baseline="0" dirty="0" smtClean="0"/>
-              <a:t>.</a:t>
+              <a:t> status command again.</a:t>
             </a:r>
           </a:p>
           <a:p>
@@ -8120,11 +8079,7 @@
             </a:pPr>
             <a:r>
               <a:rPr lang="en-US" sz="2400" dirty="0" smtClean="0"/>
-              <a:t>This </a:t>
-            </a:r>
-            <a:r>
-              <a:rPr lang="en-US" sz="2400" dirty="0" smtClean="0"/>
-              <a:t>will commit the files </a:t>
+              <a:t>This will commit the files </a:t>
             </a:r>
             <a:endParaRPr lang="en-US" sz="2400" dirty="0"/>
           </a:p>
@@ -15316,19 +15271,7 @@
           <a:p>
             <a:r>
               <a:rPr lang="en-US" dirty="0" smtClean="0"/>
-              <a:t>Next </a:t>
-            </a:r>
-            <a:r>
-              <a:rPr lang="en-US" dirty="0" smtClean="0"/>
-              <a:t>some practice</a:t>
-            </a:r>
-            <a:r>
-              <a:rPr lang="en-US" dirty="0" smtClean="0"/>
-              <a:t>.  </a:t>
-            </a:r>
-            <a:r>
-              <a:rPr lang="en-US" dirty="0" smtClean="0"/>
-              <a:t>But first any questions so far?</a:t>
+              <a:t>Next some practice.  But first any questions so far?</a:t>
             </a:r>
             <a:endParaRPr lang="en-US" dirty="0"/>
           </a:p>
@@ -15549,11 +15492,7 @@
           <a:p>
             <a:r>
               <a:rPr lang="en-US" dirty="0" smtClean="0"/>
-              <a:t>Next </a:t>
-            </a:r>
-            <a:r>
-              <a:rPr lang="en-US" dirty="0" smtClean="0"/>
-              <a:t>up is GitHub</a:t>
+              <a:t>Next up is GitHub</a:t>
             </a:r>
             <a:endParaRPr lang="en-US" dirty="0"/>
           </a:p>
@@ -15592,6 +15531,13 @@
   <p:clrMapOvr>
     <a:masterClrMapping/>
   </p:clrMapOvr>
+  <p:timing>
+    <p:tnLst>
+      <p:par>
+        <p:cTn id="1" dur="indefinite" restart="never" nodeType="tmRoot"/>
+      </p:par>
+    </p:tnLst>
+  </p:timing>
 </p:sld>
 </file>
 
@@ -16265,7 +16211,7 @@
         </p:blipFill>
         <p:spPr>
           <a:xfrm>
-            <a:off x="598516" y="1095202"/>
+            <a:off x="598516" y="1122096"/>
             <a:ext cx="9449947" cy="5500018"/>
           </a:xfrm>
           <a:prstGeom prst="rect">
@@ -16470,652 +16416,6 @@
           <a:p>
             <a:r>
               <a:rPr lang="en-US" dirty="0" smtClean="0"/>
-              <a:t>Work flow when Collaborating with GitHub</a:t>
-            </a:r>
-            <a:endParaRPr lang="en-US" dirty="0"/>
-          </a:p>
-        </p:txBody>
-      </p:sp>
-      <p:sp>
-        <p:nvSpPr>
-          <p:cNvPr id="5" name="Content Placeholder 2"/>
-          <p:cNvSpPr>
-            <a:spLocks noGrp="1"/>
-          </p:cNvSpPr>
-          <p:nvPr>
-            <p:ph idx="1"/>
-          </p:nvPr>
-        </p:nvSpPr>
-        <p:spPr>
-          <a:xfrm>
-            <a:off x="838200" y="1315557"/>
-            <a:ext cx="10515600" cy="4308003"/>
-          </a:xfrm>
-        </p:spPr>
-        <p:txBody>
-          <a:bodyPr>
-            <a:noAutofit/>
-          </a:bodyPr>
-          <a:lstStyle/>
-          <a:p>
-            <a:pPr marL="0" indent="0">
-              <a:buNone/>
-            </a:pPr>
-            <a:r>
-              <a:rPr lang="en-US" sz="3200" b="1" dirty="0"/>
-              <a:t>1. Create </a:t>
-            </a:r>
-            <a:r>
-              <a:rPr lang="en-US" sz="3200" b="1" dirty="0" smtClean="0"/>
-              <a:t>a </a:t>
-            </a:r>
-            <a:r>
-              <a:rPr lang="en-US" sz="3200" b="1" dirty="0"/>
-              <a:t>branch from master.</a:t>
-            </a:r>
-          </a:p>
-          <a:p>
-            <a:pPr marL="0" indent="0">
-              <a:buNone/>
-            </a:pPr>
-            <a:r>
-              <a:rPr lang="en-US" sz="3200" b="1" dirty="0"/>
-              <a:t>2. Make some commits to improve the project.</a:t>
-            </a:r>
-          </a:p>
-          <a:p>
-            <a:pPr marL="0" indent="0">
-              <a:buNone/>
-            </a:pPr>
-            <a:r>
-              <a:rPr lang="en-US" sz="3200" b="1" dirty="0"/>
-              <a:t>3. Push this branch to your GitHub project.</a:t>
-            </a:r>
-          </a:p>
-          <a:p>
-            <a:pPr marL="0" indent="0">
-              <a:buNone/>
-            </a:pPr>
-            <a:r>
-              <a:rPr lang="en-US" sz="3200" b="1" dirty="0"/>
-              <a:t>4. Open a Pull Request on GitHub.</a:t>
-            </a:r>
-          </a:p>
-          <a:p>
-            <a:pPr marL="0" indent="0">
-              <a:buNone/>
-            </a:pPr>
-            <a:r>
-              <a:rPr lang="en-US" sz="3200" b="1" dirty="0"/>
-              <a:t>5. Discuss, and optionally continue committing.</a:t>
-            </a:r>
-          </a:p>
-          <a:p>
-            <a:pPr marL="0" indent="0">
-              <a:buNone/>
-            </a:pPr>
-            <a:r>
-              <a:rPr lang="en-US" sz="3200" b="1" dirty="0"/>
-              <a:t>6. The project owner merges or closes the Pull </a:t>
-            </a:r>
-            <a:r>
-              <a:rPr lang="en-US" sz="3200" b="1" dirty="0" smtClean="0"/>
-              <a:t>Request.</a:t>
-            </a:r>
-          </a:p>
-          <a:p>
-            <a:pPr marL="0" indent="0">
-              <a:buNone/>
-            </a:pPr>
-            <a:r>
-              <a:rPr lang="en-US" sz="2400" dirty="0" smtClean="0">
-                <a:solidFill>
-                  <a:prstClr val="black"/>
-                </a:solidFill>
-              </a:rPr>
-              <a:t>         </a:t>
-            </a:r>
-            <a:endParaRPr lang="en-US" sz="2400" dirty="0"/>
-          </a:p>
-          <a:p>
-            <a:pPr marL="0" lvl="0" indent="0">
-              <a:buNone/>
-            </a:pPr>
-            <a:r>
-              <a:rPr lang="en-US" sz="2400" dirty="0" smtClean="0">
-                <a:solidFill>
-                  <a:prstClr val="black"/>
-                </a:solidFill>
-              </a:rPr>
-              <a:t>* This was taken from </a:t>
-            </a:r>
-            <a:r>
-              <a:rPr lang="en-US" sz="2400" dirty="0" err="1" smtClean="0">
-                <a:solidFill>
-                  <a:prstClr val="black"/>
-                </a:solidFill>
-              </a:rPr>
-              <a:t>ProGit</a:t>
-            </a:r>
-            <a:r>
-              <a:rPr lang="en-US" sz="2400" dirty="0" smtClean="0">
-                <a:solidFill>
-                  <a:prstClr val="black"/>
-                </a:solidFill>
-              </a:rPr>
-              <a:t>, an open </a:t>
-            </a:r>
-            <a:r>
-              <a:rPr lang="en-US" sz="2400" dirty="0">
-                <a:solidFill>
-                  <a:prstClr val="black"/>
-                </a:solidFill>
-              </a:rPr>
-              <a:t>source book at https://progit.org/</a:t>
-            </a:r>
-          </a:p>
-          <a:p>
-            <a:pPr marL="0" lvl="0" indent="0">
-              <a:buNone/>
-            </a:pPr>
-            <a:endParaRPr lang="en-US" sz="3600" b="1" dirty="0" smtClean="0"/>
-          </a:p>
-          <a:p>
-            <a:pPr marL="0" lvl="0" indent="0">
-              <a:buNone/>
-            </a:pPr>
-            <a:endParaRPr lang="en-US" sz="3200" b="1" dirty="0"/>
-          </a:p>
-          <a:p>
-            <a:pPr marL="0" indent="0">
-              <a:buNone/>
-            </a:pPr>
-            <a:endParaRPr lang="en-US" sz="3200" b="1" dirty="0" smtClean="0"/>
-          </a:p>
-          <a:p>
-            <a:pPr marL="0" indent="0">
-              <a:buNone/>
-            </a:pPr>
-            <a:endParaRPr lang="en-US" sz="1800" dirty="0" smtClean="0"/>
-          </a:p>
-        </p:txBody>
-      </p:sp>
-    </p:spTree>
-    <p:extLst>
-      <p:ext uri="{BB962C8B-B14F-4D97-AF65-F5344CB8AC3E}">
-        <p14:creationId xmlns:p14="http://schemas.microsoft.com/office/powerpoint/2010/main" val="2739924176"/>
-      </p:ext>
-    </p:extLst>
-  </p:cSld>
-  <p:clrMapOvr>
-    <a:masterClrMapping/>
-  </p:clrMapOvr>
-  <p:timing>
-    <p:tnLst>
-      <p:par>
-        <p:cTn id="1" dur="indefinite" restart="never" nodeType="tmRoot"/>
-      </p:par>
-    </p:tnLst>
-  </p:timing>
-</p:sld>
-</file>
-
-<file path=ppt/slides/slide31.xml><?xml version="1.0" encoding="utf-8"?>
-<p:sld xmlns:a="http://schemas.openxmlformats.org/drawingml/2006/main" xmlns:r="http://schemas.openxmlformats.org/officeDocument/2006/relationships" xmlns:p="http://schemas.openxmlformats.org/presentationml/2006/main">
-  <p:cSld>
-    <p:spTree>
-      <p:nvGrpSpPr>
-        <p:cNvPr id="1" name=""/>
-        <p:cNvGrpSpPr/>
-        <p:nvPr/>
-      </p:nvGrpSpPr>
-      <p:grpSpPr>
-        <a:xfrm>
-          <a:off x="0" y="0"/>
-          <a:ext cx="0" cy="0"/>
-          <a:chOff x="0" y="0"/>
-          <a:chExt cx="0" cy="0"/>
-        </a:xfrm>
-      </p:grpSpPr>
-      <p:sp>
-        <p:nvSpPr>
-          <p:cNvPr id="2" name="Title 1"/>
-          <p:cNvSpPr>
-            <a:spLocks noGrp="1"/>
-          </p:cNvSpPr>
-          <p:nvPr>
-            <p:ph type="title"/>
-          </p:nvPr>
-        </p:nvSpPr>
-        <p:spPr>
-          <a:xfrm>
-            <a:off x="838200" y="-10006"/>
-            <a:ext cx="10515600" cy="1325563"/>
-          </a:xfrm>
-        </p:spPr>
-        <p:txBody>
-          <a:bodyPr/>
-          <a:lstStyle/>
-          <a:p>
-            <a:r>
-              <a:rPr lang="en-US" dirty="0" smtClean="0"/>
-              <a:t>Work Through and Example</a:t>
-            </a:r>
-            <a:endParaRPr lang="en-US" dirty="0"/>
-          </a:p>
-        </p:txBody>
-      </p:sp>
-      <p:sp>
-        <p:nvSpPr>
-          <p:cNvPr id="3" name="Content Placeholder 2"/>
-          <p:cNvSpPr>
-            <a:spLocks noGrp="1"/>
-          </p:cNvSpPr>
-          <p:nvPr>
-            <p:ph idx="1"/>
-          </p:nvPr>
-        </p:nvSpPr>
-        <p:spPr>
-          <a:xfrm>
-            <a:off x="838200" y="1315557"/>
-            <a:ext cx="10515600" cy="5542443"/>
-          </a:xfrm>
-        </p:spPr>
-        <p:txBody>
-          <a:bodyPr>
-            <a:noAutofit/>
-          </a:bodyPr>
-          <a:lstStyle/>
-          <a:p>
-            <a:pPr marL="0" indent="0">
-              <a:buNone/>
-            </a:pPr>
-            <a:r>
-              <a:rPr lang="en-US" sz="2400" dirty="0" smtClean="0">
-                <a:solidFill>
-                  <a:prstClr val="black"/>
-                </a:solidFill>
-              </a:rPr>
-              <a:t>Clone a copy of the repo you just created (with the README) in your GitHub account</a:t>
-            </a:r>
-            <a:endParaRPr lang="en-US" sz="2400" dirty="0" smtClean="0"/>
-          </a:p>
-          <a:p>
-            <a:pPr marL="0" indent="0">
-              <a:buNone/>
-            </a:pPr>
-            <a:endParaRPr lang="en-US" sz="2400" dirty="0" smtClean="0">
-              <a:solidFill>
-                <a:prstClr val="black"/>
-              </a:solidFill>
-            </a:endParaRPr>
-          </a:p>
-          <a:p>
-            <a:pPr marL="0" indent="0">
-              <a:buNone/>
-            </a:pPr>
-            <a:r>
-              <a:rPr lang="en-US" sz="2400" dirty="0" smtClean="0">
-                <a:solidFill>
-                  <a:prstClr val="black"/>
-                </a:solidFill>
-              </a:rPr>
-              <a:t> </a:t>
-            </a:r>
-            <a:r>
-              <a:rPr lang="en-US" sz="2400" dirty="0" smtClean="0"/>
-              <a:t>This </a:t>
-            </a:r>
-            <a:r>
-              <a:rPr lang="en-US" sz="2400" dirty="0"/>
-              <a:t>creates a </a:t>
-            </a:r>
-            <a:r>
-              <a:rPr lang="en-US" sz="2400" dirty="0" smtClean="0"/>
-              <a:t>copy of the repo on </a:t>
-            </a:r>
-            <a:r>
-              <a:rPr lang="en-US" sz="2400" dirty="0" smtClean="0"/>
-              <a:t>your local working directory</a:t>
-            </a:r>
-          </a:p>
-          <a:p>
-            <a:pPr marL="0" indent="0">
-              <a:buNone/>
-            </a:pPr>
-            <a:endParaRPr lang="en-US" sz="2400" dirty="0" smtClean="0"/>
-          </a:p>
-          <a:p>
-            <a:pPr marL="0" indent="0">
-              <a:buNone/>
-            </a:pPr>
-            <a:r>
-              <a:rPr lang="en-US" sz="2400" dirty="0" smtClean="0"/>
-              <a:t>Change your working directory to your new repo</a:t>
-            </a:r>
-          </a:p>
-          <a:p>
-            <a:pPr marL="0" indent="0">
-              <a:buNone/>
-            </a:pPr>
-            <a:endParaRPr lang="en-US" sz="2400" dirty="0"/>
-          </a:p>
-          <a:p>
-            <a:pPr marL="0" indent="0">
-              <a:buNone/>
-            </a:pPr>
-            <a:endParaRPr lang="en-US" sz="2400" dirty="0" smtClean="0"/>
-          </a:p>
-          <a:p>
-            <a:pPr marL="0" indent="0">
-              <a:buNone/>
-            </a:pPr>
-            <a:r>
-              <a:rPr lang="en-US" sz="2400" dirty="0" smtClean="0"/>
-              <a:t>Create a new branch</a:t>
-            </a:r>
-            <a:endParaRPr lang="en-US" sz="2400" dirty="0"/>
-          </a:p>
-          <a:p>
-            <a:pPr marL="0" indent="0">
-              <a:buNone/>
-            </a:pPr>
-            <a:endParaRPr lang="en-US" sz="2400" dirty="0"/>
-          </a:p>
-          <a:p>
-            <a:pPr marL="0" indent="0">
-              <a:buNone/>
-            </a:pPr>
-            <a:r>
-              <a:rPr lang="en-US" sz="2400" dirty="0" smtClean="0">
-                <a:solidFill>
-                  <a:prstClr val="black"/>
-                </a:solidFill>
-              </a:rPr>
-              <a:t>  </a:t>
-            </a:r>
-            <a:endParaRPr lang="en-US" sz="2400" dirty="0"/>
-          </a:p>
-          <a:p>
-            <a:pPr marL="0" lvl="0" indent="0">
-              <a:buNone/>
-            </a:pPr>
-            <a:endParaRPr lang="en-US" sz="2400" dirty="0">
-              <a:solidFill>
-                <a:prstClr val="black"/>
-              </a:solidFill>
-            </a:endParaRPr>
-          </a:p>
-          <a:p>
-            <a:pPr marL="0" lvl="0" indent="0">
-              <a:buNone/>
-            </a:pPr>
-            <a:endParaRPr lang="en-US" sz="3600" b="1" dirty="0" smtClean="0"/>
-          </a:p>
-          <a:p>
-            <a:pPr marL="0" lvl="0" indent="0">
-              <a:buNone/>
-            </a:pPr>
-            <a:endParaRPr lang="en-US" sz="3200" b="1" dirty="0"/>
-          </a:p>
-          <a:p>
-            <a:pPr marL="0" indent="0">
-              <a:buNone/>
-            </a:pPr>
-            <a:endParaRPr lang="en-US" sz="3200" b="1" dirty="0" smtClean="0"/>
-          </a:p>
-          <a:p>
-            <a:pPr marL="0" indent="0">
-              <a:buNone/>
-            </a:pPr>
-            <a:endParaRPr lang="en-US" sz="1800" dirty="0" smtClean="0"/>
-          </a:p>
-        </p:txBody>
-      </p:sp>
-      <p:sp>
-        <p:nvSpPr>
-          <p:cNvPr id="8" name="TextBox 7"/>
-          <p:cNvSpPr txBox="1"/>
-          <p:nvPr/>
-        </p:nvSpPr>
-        <p:spPr>
-          <a:xfrm>
-            <a:off x="838200" y="2111714"/>
-            <a:ext cx="5532402" cy="400110"/>
-          </a:xfrm>
-          <a:prstGeom prst="rect">
-            <a:avLst/>
-          </a:prstGeom>
-          <a:solidFill>
-            <a:schemeClr val="tx1">
-              <a:lumMod val="85000"/>
-              <a:lumOff val="15000"/>
-            </a:schemeClr>
-          </a:solidFill>
-        </p:spPr>
-        <p:txBody>
-          <a:bodyPr wrap="square" rtlCol="0">
-            <a:spAutoFit/>
-          </a:bodyPr>
-          <a:lstStyle/>
-          <a:p>
-            <a:r>
-              <a:rPr lang="en-US" sz="2000" dirty="0" smtClean="0">
-                <a:solidFill>
-                  <a:schemeClr val="bg1"/>
-                </a:solidFill>
-              </a:rPr>
-              <a:t>$ </a:t>
-            </a:r>
-            <a:r>
-              <a:rPr lang="en-US" sz="2000" dirty="0" err="1" smtClean="0">
-                <a:solidFill>
-                  <a:schemeClr val="bg1"/>
-                </a:solidFill>
-              </a:rPr>
-              <a:t>git</a:t>
-            </a:r>
-            <a:r>
-              <a:rPr lang="en-US" sz="2000" dirty="0">
-                <a:solidFill>
-                  <a:schemeClr val="bg1"/>
-                </a:solidFill>
-              </a:rPr>
-              <a:t> </a:t>
-            </a:r>
-            <a:r>
-              <a:rPr lang="en-US" sz="2000" dirty="0" smtClean="0">
-                <a:solidFill>
-                  <a:schemeClr val="bg1"/>
-                </a:solidFill>
-              </a:rPr>
-              <a:t> </a:t>
-            </a:r>
-            <a:r>
-              <a:rPr lang="en-US" sz="2000" dirty="0">
-                <a:solidFill>
-                  <a:schemeClr val="bg1"/>
-                </a:solidFill>
-              </a:rPr>
-              <a:t>clone </a:t>
-            </a:r>
-            <a:r>
-              <a:rPr lang="en-US" sz="2000" dirty="0" smtClean="0">
-                <a:solidFill>
-                  <a:schemeClr val="bg1"/>
-                </a:solidFill>
-              </a:rPr>
-              <a:t> &lt;https://new repo&gt;</a:t>
-            </a:r>
-            <a:endParaRPr lang="en-US" sz="2000" dirty="0">
-              <a:solidFill>
-                <a:schemeClr val="bg1"/>
-              </a:solidFill>
-            </a:endParaRPr>
-          </a:p>
-        </p:txBody>
-      </p:sp>
-      <p:sp>
-        <p:nvSpPr>
-          <p:cNvPr id="9" name="TextBox 8"/>
-          <p:cNvSpPr txBox="1"/>
-          <p:nvPr/>
-        </p:nvSpPr>
-        <p:spPr>
-          <a:xfrm>
-            <a:off x="838200" y="3886723"/>
-            <a:ext cx="5532402" cy="400110"/>
-          </a:xfrm>
-          <a:prstGeom prst="rect">
-            <a:avLst/>
-          </a:prstGeom>
-          <a:solidFill>
-            <a:schemeClr val="tx1">
-              <a:lumMod val="85000"/>
-              <a:lumOff val="15000"/>
-            </a:schemeClr>
-          </a:solidFill>
-        </p:spPr>
-        <p:txBody>
-          <a:bodyPr wrap="square" rtlCol="0">
-            <a:spAutoFit/>
-          </a:bodyPr>
-          <a:lstStyle/>
-          <a:p>
-            <a:r>
-              <a:rPr lang="en-US" sz="2000" dirty="0" smtClean="0">
-                <a:solidFill>
-                  <a:schemeClr val="bg1"/>
-                </a:solidFill>
-              </a:rPr>
-              <a:t>$ cd &lt;path to new repo&gt;</a:t>
-            </a:r>
-            <a:endParaRPr lang="en-US" sz="2000" dirty="0">
-              <a:solidFill>
-                <a:schemeClr val="bg1"/>
-              </a:solidFill>
-            </a:endParaRPr>
-          </a:p>
-        </p:txBody>
-      </p:sp>
-      <p:sp>
-        <p:nvSpPr>
-          <p:cNvPr id="10" name="TextBox 9"/>
-          <p:cNvSpPr txBox="1"/>
-          <p:nvPr/>
-        </p:nvSpPr>
-        <p:spPr>
-          <a:xfrm>
-            <a:off x="838200" y="5261622"/>
-            <a:ext cx="5532402" cy="400110"/>
-          </a:xfrm>
-          <a:prstGeom prst="rect">
-            <a:avLst/>
-          </a:prstGeom>
-          <a:solidFill>
-            <a:schemeClr val="tx1">
-              <a:lumMod val="85000"/>
-              <a:lumOff val="15000"/>
-            </a:schemeClr>
-          </a:solidFill>
-        </p:spPr>
-        <p:txBody>
-          <a:bodyPr wrap="square" rtlCol="0">
-            <a:spAutoFit/>
-          </a:bodyPr>
-          <a:lstStyle/>
-          <a:p>
-            <a:r>
-              <a:rPr lang="en-US" sz="2000" dirty="0" smtClean="0">
-                <a:solidFill>
-                  <a:schemeClr val="bg1"/>
-                </a:solidFill>
-              </a:rPr>
-              <a:t>$ </a:t>
-            </a:r>
-            <a:r>
-              <a:rPr lang="en-US" sz="2000" dirty="0" err="1" smtClean="0">
-                <a:solidFill>
-                  <a:schemeClr val="bg1"/>
-                </a:solidFill>
-              </a:rPr>
-              <a:t>git</a:t>
-            </a:r>
-            <a:r>
-              <a:rPr lang="en-US" sz="2000" dirty="0" smtClean="0">
-                <a:solidFill>
-                  <a:schemeClr val="bg1"/>
-                </a:solidFill>
-              </a:rPr>
-              <a:t> branch  &lt;branch name&gt;</a:t>
-            </a:r>
-            <a:endParaRPr lang="en-US" sz="2000" dirty="0">
-              <a:solidFill>
-                <a:schemeClr val="bg1"/>
-              </a:solidFill>
-            </a:endParaRPr>
-          </a:p>
-        </p:txBody>
-      </p:sp>
-    </p:spTree>
-    <p:extLst>
-      <p:ext uri="{BB962C8B-B14F-4D97-AF65-F5344CB8AC3E}">
-        <p14:creationId xmlns:p14="http://schemas.microsoft.com/office/powerpoint/2010/main" val="1278382332"/>
-      </p:ext>
-    </p:extLst>
-  </p:cSld>
-  <p:clrMapOvr>
-    <a:masterClrMapping/>
-  </p:clrMapOvr>
-  <p:timing>
-    <p:tnLst>
-      <p:par>
-        <p:cTn id="1" dur="indefinite" restart="never" nodeType="tmRoot"/>
-      </p:par>
-    </p:tnLst>
-  </p:timing>
-</p:sld>
-</file>
-
-<file path=ppt/slides/slide32.xml><?xml version="1.0" encoding="utf-8"?>
-<p:sld xmlns:a="http://schemas.openxmlformats.org/drawingml/2006/main" xmlns:r="http://schemas.openxmlformats.org/officeDocument/2006/relationships" xmlns:p="http://schemas.openxmlformats.org/presentationml/2006/main">
-  <p:cSld>
-    <p:spTree>
-      <p:nvGrpSpPr>
-        <p:cNvPr id="1" name=""/>
-        <p:cNvGrpSpPr/>
-        <p:nvPr/>
-      </p:nvGrpSpPr>
-      <p:grpSpPr>
-        <a:xfrm>
-          <a:off x="0" y="0"/>
-          <a:ext cx="0" cy="0"/>
-          <a:chOff x="0" y="0"/>
-          <a:chExt cx="0" cy="0"/>
-        </a:xfrm>
-      </p:grpSpPr>
-      <p:sp>
-        <p:nvSpPr>
-          <p:cNvPr id="2" name="Title 1"/>
-          <p:cNvSpPr>
-            <a:spLocks noGrp="1"/>
-          </p:cNvSpPr>
-          <p:nvPr>
-            <p:ph type="title"/>
-          </p:nvPr>
-        </p:nvSpPr>
-        <p:spPr>
-          <a:xfrm>
-            <a:off x="838200" y="-10006"/>
-            <a:ext cx="10515600" cy="1325563"/>
-          </a:xfrm>
-        </p:spPr>
-        <p:txBody>
-          <a:bodyPr/>
-          <a:lstStyle/>
-          <a:p>
-            <a:r>
-              <a:rPr lang="en-US" dirty="0" smtClean="0"/>
               <a:t>Create a Local Copy</a:t>
             </a:r>
             <a:endParaRPr lang="en-US" dirty="0"/>
@@ -17318,7 +16618,7 @@
         </p:nvGrpSpPr>
         <p:grpSpPr>
           <a:xfrm>
-            <a:off x="300123" y="125124"/>
+            <a:off x="300123" y="69081"/>
             <a:ext cx="11591753" cy="6732876"/>
             <a:chOff x="145818" y="125124"/>
             <a:chExt cx="11591753" cy="6732876"/>
@@ -17534,6 +16834,648 @@
 </p:sld>
 </file>
 
+<file path=ppt/slides/slide31.xml><?xml version="1.0" encoding="utf-8"?>
+<p:sld xmlns:a="http://schemas.openxmlformats.org/drawingml/2006/main" xmlns:r="http://schemas.openxmlformats.org/officeDocument/2006/relationships" xmlns:p="http://schemas.openxmlformats.org/presentationml/2006/main">
+  <p:cSld>
+    <p:spTree>
+      <p:nvGrpSpPr>
+        <p:cNvPr id="1" name=""/>
+        <p:cNvGrpSpPr/>
+        <p:nvPr/>
+      </p:nvGrpSpPr>
+      <p:grpSpPr>
+        <a:xfrm>
+          <a:off x="0" y="0"/>
+          <a:ext cx="0" cy="0"/>
+          <a:chOff x="0" y="0"/>
+          <a:chExt cx="0" cy="0"/>
+        </a:xfrm>
+      </p:grpSpPr>
+      <p:sp>
+        <p:nvSpPr>
+          <p:cNvPr id="2" name="Title 1"/>
+          <p:cNvSpPr>
+            <a:spLocks noGrp="1"/>
+          </p:cNvSpPr>
+          <p:nvPr>
+            <p:ph type="title"/>
+          </p:nvPr>
+        </p:nvSpPr>
+        <p:spPr>
+          <a:xfrm>
+            <a:off x="838200" y="-10006"/>
+            <a:ext cx="10515600" cy="1325563"/>
+          </a:xfrm>
+        </p:spPr>
+        <p:txBody>
+          <a:bodyPr/>
+          <a:lstStyle/>
+          <a:p>
+            <a:r>
+              <a:rPr lang="en-US" dirty="0" smtClean="0"/>
+              <a:t>Work flow when Collaborating with GitHub</a:t>
+            </a:r>
+            <a:endParaRPr lang="en-US" dirty="0"/>
+          </a:p>
+        </p:txBody>
+      </p:sp>
+      <p:sp>
+        <p:nvSpPr>
+          <p:cNvPr id="5" name="Content Placeholder 2"/>
+          <p:cNvSpPr>
+            <a:spLocks noGrp="1"/>
+          </p:cNvSpPr>
+          <p:nvPr>
+            <p:ph idx="1"/>
+          </p:nvPr>
+        </p:nvSpPr>
+        <p:spPr>
+          <a:xfrm>
+            <a:off x="838200" y="1315557"/>
+            <a:ext cx="10515600" cy="4308003"/>
+          </a:xfrm>
+        </p:spPr>
+        <p:txBody>
+          <a:bodyPr>
+            <a:noAutofit/>
+          </a:bodyPr>
+          <a:lstStyle/>
+          <a:p>
+            <a:pPr marL="0" indent="0">
+              <a:buNone/>
+            </a:pPr>
+            <a:r>
+              <a:rPr lang="en-US" sz="3200" b="1" dirty="0"/>
+              <a:t>1. Create </a:t>
+            </a:r>
+            <a:r>
+              <a:rPr lang="en-US" sz="3200" b="1" dirty="0" smtClean="0"/>
+              <a:t>a </a:t>
+            </a:r>
+            <a:r>
+              <a:rPr lang="en-US" sz="3200" b="1" dirty="0"/>
+              <a:t>branch from master.</a:t>
+            </a:r>
+          </a:p>
+          <a:p>
+            <a:pPr marL="0" indent="0">
+              <a:buNone/>
+            </a:pPr>
+            <a:r>
+              <a:rPr lang="en-US" sz="3200" b="1" dirty="0"/>
+              <a:t>2. Make some commits to improve the project.</a:t>
+            </a:r>
+          </a:p>
+          <a:p>
+            <a:pPr marL="0" indent="0">
+              <a:buNone/>
+            </a:pPr>
+            <a:r>
+              <a:rPr lang="en-US" sz="3200" b="1" dirty="0"/>
+              <a:t>3. Push this branch to your GitHub project.</a:t>
+            </a:r>
+          </a:p>
+          <a:p>
+            <a:pPr marL="0" indent="0">
+              <a:buNone/>
+            </a:pPr>
+            <a:r>
+              <a:rPr lang="en-US" sz="3200" b="1" dirty="0"/>
+              <a:t>4. Open a Pull Request on GitHub.</a:t>
+            </a:r>
+          </a:p>
+          <a:p>
+            <a:pPr marL="0" indent="0">
+              <a:buNone/>
+            </a:pPr>
+            <a:r>
+              <a:rPr lang="en-US" sz="3200" b="1" dirty="0"/>
+              <a:t>5. Discuss, and optionally continue committing.</a:t>
+            </a:r>
+          </a:p>
+          <a:p>
+            <a:pPr marL="0" indent="0">
+              <a:buNone/>
+            </a:pPr>
+            <a:r>
+              <a:rPr lang="en-US" sz="3200" b="1" dirty="0"/>
+              <a:t>6. The project owner merges or closes the Pull </a:t>
+            </a:r>
+            <a:r>
+              <a:rPr lang="en-US" sz="3200" b="1" dirty="0" smtClean="0"/>
+              <a:t>Request.</a:t>
+            </a:r>
+          </a:p>
+          <a:p>
+            <a:pPr marL="0" indent="0">
+              <a:buNone/>
+            </a:pPr>
+            <a:r>
+              <a:rPr lang="en-US" sz="2400" dirty="0" smtClean="0">
+                <a:solidFill>
+                  <a:prstClr val="black"/>
+                </a:solidFill>
+              </a:rPr>
+              <a:t>         </a:t>
+            </a:r>
+            <a:endParaRPr lang="en-US" sz="2400" dirty="0"/>
+          </a:p>
+          <a:p>
+            <a:pPr marL="0" lvl="0" indent="0">
+              <a:buNone/>
+            </a:pPr>
+            <a:r>
+              <a:rPr lang="en-US" sz="2400" dirty="0" smtClean="0">
+                <a:solidFill>
+                  <a:prstClr val="black"/>
+                </a:solidFill>
+              </a:rPr>
+              <a:t>* This was taken from </a:t>
+            </a:r>
+            <a:r>
+              <a:rPr lang="en-US" sz="2400" dirty="0" err="1" smtClean="0">
+                <a:solidFill>
+                  <a:prstClr val="black"/>
+                </a:solidFill>
+              </a:rPr>
+              <a:t>ProGit</a:t>
+            </a:r>
+            <a:r>
+              <a:rPr lang="en-US" sz="2400" dirty="0" smtClean="0">
+                <a:solidFill>
+                  <a:prstClr val="black"/>
+                </a:solidFill>
+              </a:rPr>
+              <a:t>, an open </a:t>
+            </a:r>
+            <a:r>
+              <a:rPr lang="en-US" sz="2400" dirty="0">
+                <a:solidFill>
+                  <a:prstClr val="black"/>
+                </a:solidFill>
+              </a:rPr>
+              <a:t>source book at https://progit.org/</a:t>
+            </a:r>
+          </a:p>
+          <a:p>
+            <a:pPr marL="0" lvl="0" indent="0">
+              <a:buNone/>
+            </a:pPr>
+            <a:endParaRPr lang="en-US" sz="3600" b="1" dirty="0" smtClean="0"/>
+          </a:p>
+          <a:p>
+            <a:pPr marL="0" lvl="0" indent="0">
+              <a:buNone/>
+            </a:pPr>
+            <a:endParaRPr lang="en-US" sz="3200" b="1" dirty="0"/>
+          </a:p>
+          <a:p>
+            <a:pPr marL="0" indent="0">
+              <a:buNone/>
+            </a:pPr>
+            <a:endParaRPr lang="en-US" sz="3200" b="1" dirty="0" smtClean="0"/>
+          </a:p>
+          <a:p>
+            <a:pPr marL="0" indent="0">
+              <a:buNone/>
+            </a:pPr>
+            <a:endParaRPr lang="en-US" sz="1800" dirty="0" smtClean="0"/>
+          </a:p>
+        </p:txBody>
+      </p:sp>
+    </p:spTree>
+    <p:extLst>
+      <p:ext uri="{BB962C8B-B14F-4D97-AF65-F5344CB8AC3E}">
+        <p14:creationId xmlns:p14="http://schemas.microsoft.com/office/powerpoint/2010/main" val="2739924176"/>
+      </p:ext>
+    </p:extLst>
+  </p:cSld>
+  <p:clrMapOvr>
+    <a:masterClrMapping/>
+  </p:clrMapOvr>
+  <p:timing>
+    <p:tnLst>
+      <p:par>
+        <p:cTn id="1" dur="indefinite" restart="never" nodeType="tmRoot"/>
+      </p:par>
+    </p:tnLst>
+  </p:timing>
+</p:sld>
+</file>
+
+<file path=ppt/slides/slide32.xml><?xml version="1.0" encoding="utf-8"?>
+<p:sld xmlns:a="http://schemas.openxmlformats.org/drawingml/2006/main" xmlns:r="http://schemas.openxmlformats.org/officeDocument/2006/relationships" xmlns:p="http://schemas.openxmlformats.org/presentationml/2006/main">
+  <p:cSld>
+    <p:spTree>
+      <p:nvGrpSpPr>
+        <p:cNvPr id="1" name=""/>
+        <p:cNvGrpSpPr/>
+        <p:nvPr/>
+      </p:nvGrpSpPr>
+      <p:grpSpPr>
+        <a:xfrm>
+          <a:off x="0" y="0"/>
+          <a:ext cx="0" cy="0"/>
+          <a:chOff x="0" y="0"/>
+          <a:chExt cx="0" cy="0"/>
+        </a:xfrm>
+      </p:grpSpPr>
+      <p:sp>
+        <p:nvSpPr>
+          <p:cNvPr id="2" name="Title 1"/>
+          <p:cNvSpPr>
+            <a:spLocks noGrp="1"/>
+          </p:cNvSpPr>
+          <p:nvPr>
+            <p:ph type="title"/>
+          </p:nvPr>
+        </p:nvSpPr>
+        <p:spPr>
+          <a:xfrm>
+            <a:off x="838200" y="-10006"/>
+            <a:ext cx="10515600" cy="1325563"/>
+          </a:xfrm>
+        </p:spPr>
+        <p:txBody>
+          <a:bodyPr/>
+          <a:lstStyle/>
+          <a:p>
+            <a:r>
+              <a:rPr lang="en-US" dirty="0" smtClean="0"/>
+              <a:t>Work Through and Example</a:t>
+            </a:r>
+            <a:endParaRPr lang="en-US" dirty="0"/>
+          </a:p>
+        </p:txBody>
+      </p:sp>
+      <p:sp>
+        <p:nvSpPr>
+          <p:cNvPr id="3" name="Content Placeholder 2"/>
+          <p:cNvSpPr>
+            <a:spLocks noGrp="1"/>
+          </p:cNvSpPr>
+          <p:nvPr>
+            <p:ph idx="1"/>
+          </p:nvPr>
+        </p:nvSpPr>
+        <p:spPr>
+          <a:xfrm>
+            <a:off x="838200" y="1315557"/>
+            <a:ext cx="10515600" cy="5542443"/>
+          </a:xfrm>
+        </p:spPr>
+        <p:txBody>
+          <a:bodyPr>
+            <a:noAutofit/>
+          </a:bodyPr>
+          <a:lstStyle/>
+          <a:p>
+            <a:pPr marL="0" indent="0">
+              <a:buNone/>
+            </a:pPr>
+            <a:r>
+              <a:rPr lang="en-US" sz="2400" dirty="0" smtClean="0">
+                <a:solidFill>
+                  <a:prstClr val="black"/>
+                </a:solidFill>
+              </a:rPr>
+              <a:t>Clone a copy of the repo you just created (with the README) in your GitHub account</a:t>
+            </a:r>
+            <a:endParaRPr lang="en-US" sz="2400" dirty="0" smtClean="0"/>
+          </a:p>
+          <a:p>
+            <a:pPr marL="0" indent="0">
+              <a:buNone/>
+            </a:pPr>
+            <a:endParaRPr lang="en-US" sz="2400" dirty="0" smtClean="0">
+              <a:solidFill>
+                <a:prstClr val="black"/>
+              </a:solidFill>
+            </a:endParaRPr>
+          </a:p>
+          <a:p>
+            <a:pPr marL="0" indent="0">
+              <a:buNone/>
+            </a:pPr>
+            <a:r>
+              <a:rPr lang="en-US" sz="2400" dirty="0" smtClean="0">
+                <a:solidFill>
+                  <a:prstClr val="black"/>
+                </a:solidFill>
+              </a:rPr>
+              <a:t> </a:t>
+            </a:r>
+            <a:r>
+              <a:rPr lang="en-US" sz="2400" dirty="0" smtClean="0"/>
+              <a:t>This </a:t>
+            </a:r>
+            <a:r>
+              <a:rPr lang="en-US" sz="2400" dirty="0"/>
+              <a:t>creates a </a:t>
+            </a:r>
+            <a:r>
+              <a:rPr lang="en-US" sz="2400" dirty="0" smtClean="0"/>
+              <a:t>copy of the repo on your local working directory</a:t>
+            </a:r>
+          </a:p>
+          <a:p>
+            <a:pPr marL="0" indent="0">
+              <a:buNone/>
+            </a:pPr>
+            <a:endParaRPr lang="en-US" sz="2400" dirty="0" smtClean="0"/>
+          </a:p>
+          <a:p>
+            <a:pPr marL="0" indent="0">
+              <a:buNone/>
+            </a:pPr>
+            <a:r>
+              <a:rPr lang="en-US" sz="2400" dirty="0" smtClean="0"/>
+              <a:t>Change your working directory to your new repo</a:t>
+            </a:r>
+          </a:p>
+          <a:p>
+            <a:pPr marL="0" indent="0">
+              <a:buNone/>
+            </a:pPr>
+            <a:endParaRPr lang="en-US" sz="2400" dirty="0"/>
+          </a:p>
+          <a:p>
+            <a:pPr marL="0" indent="0">
+              <a:buNone/>
+            </a:pPr>
+            <a:endParaRPr lang="en-US" sz="2400" dirty="0" smtClean="0"/>
+          </a:p>
+          <a:p>
+            <a:pPr marL="0" indent="0">
+              <a:buNone/>
+            </a:pPr>
+            <a:r>
+              <a:rPr lang="en-US" sz="2400" dirty="0" smtClean="0"/>
+              <a:t>Create a new branch</a:t>
+            </a:r>
+            <a:endParaRPr lang="en-US" sz="2400" dirty="0"/>
+          </a:p>
+          <a:p>
+            <a:pPr marL="0" indent="0">
+              <a:buNone/>
+            </a:pPr>
+            <a:endParaRPr lang="en-US" sz="2400" dirty="0"/>
+          </a:p>
+          <a:p>
+            <a:pPr marL="0" indent="0">
+              <a:buNone/>
+            </a:pPr>
+            <a:r>
+              <a:rPr lang="en-US" sz="2400" dirty="0" smtClean="0">
+                <a:solidFill>
+                  <a:prstClr val="black"/>
+                </a:solidFill>
+              </a:rPr>
+              <a:t>  </a:t>
+            </a:r>
+            <a:endParaRPr lang="en-US" sz="2400" dirty="0"/>
+          </a:p>
+          <a:p>
+            <a:pPr marL="0" lvl="0" indent="0">
+              <a:buNone/>
+            </a:pPr>
+            <a:endParaRPr lang="en-US" sz="2400" dirty="0">
+              <a:solidFill>
+                <a:prstClr val="black"/>
+              </a:solidFill>
+            </a:endParaRPr>
+          </a:p>
+          <a:p>
+            <a:pPr marL="0" lvl="0" indent="0">
+              <a:buNone/>
+            </a:pPr>
+            <a:endParaRPr lang="en-US" sz="3600" b="1" dirty="0" smtClean="0"/>
+          </a:p>
+          <a:p>
+            <a:pPr marL="0" lvl="0" indent="0">
+              <a:buNone/>
+            </a:pPr>
+            <a:endParaRPr lang="en-US" sz="3200" b="1" dirty="0"/>
+          </a:p>
+          <a:p>
+            <a:pPr marL="0" indent="0">
+              <a:buNone/>
+            </a:pPr>
+            <a:endParaRPr lang="en-US" sz="3200" b="1" dirty="0" smtClean="0"/>
+          </a:p>
+          <a:p>
+            <a:pPr marL="0" indent="0">
+              <a:buNone/>
+            </a:pPr>
+            <a:endParaRPr lang="en-US" sz="1800" dirty="0" smtClean="0"/>
+          </a:p>
+        </p:txBody>
+      </p:sp>
+      <p:sp>
+        <p:nvSpPr>
+          <p:cNvPr id="8" name="TextBox 7"/>
+          <p:cNvSpPr txBox="1"/>
+          <p:nvPr/>
+        </p:nvSpPr>
+        <p:spPr>
+          <a:xfrm>
+            <a:off x="838200" y="2111714"/>
+            <a:ext cx="5532402" cy="400110"/>
+          </a:xfrm>
+          <a:prstGeom prst="rect">
+            <a:avLst/>
+          </a:prstGeom>
+          <a:solidFill>
+            <a:schemeClr val="tx1">
+              <a:lumMod val="85000"/>
+              <a:lumOff val="15000"/>
+            </a:schemeClr>
+          </a:solidFill>
+        </p:spPr>
+        <p:txBody>
+          <a:bodyPr wrap="square" rtlCol="0">
+            <a:spAutoFit/>
+          </a:bodyPr>
+          <a:lstStyle/>
+          <a:p>
+            <a:r>
+              <a:rPr lang="en-US" sz="2000" dirty="0" smtClean="0">
+                <a:solidFill>
+                  <a:schemeClr val="bg1"/>
+                </a:solidFill>
+              </a:rPr>
+              <a:t>$ </a:t>
+            </a:r>
+            <a:r>
+              <a:rPr lang="en-US" sz="2000" dirty="0" err="1" smtClean="0">
+                <a:solidFill>
+                  <a:schemeClr val="bg1"/>
+                </a:solidFill>
+              </a:rPr>
+              <a:t>git</a:t>
+            </a:r>
+            <a:r>
+              <a:rPr lang="en-US" sz="2000" dirty="0">
+                <a:solidFill>
+                  <a:schemeClr val="bg1"/>
+                </a:solidFill>
+              </a:rPr>
+              <a:t> </a:t>
+            </a:r>
+            <a:r>
+              <a:rPr lang="en-US" sz="2000" dirty="0" smtClean="0">
+                <a:solidFill>
+                  <a:schemeClr val="bg1"/>
+                </a:solidFill>
+              </a:rPr>
+              <a:t> </a:t>
+            </a:r>
+            <a:r>
+              <a:rPr lang="en-US" sz="2000" dirty="0">
+                <a:solidFill>
+                  <a:schemeClr val="bg1"/>
+                </a:solidFill>
+              </a:rPr>
+              <a:t>clone </a:t>
+            </a:r>
+            <a:r>
+              <a:rPr lang="en-US" sz="2000" dirty="0" smtClean="0">
+                <a:solidFill>
+                  <a:schemeClr val="bg1"/>
+                </a:solidFill>
+              </a:rPr>
+              <a:t> &lt;https://new repo&gt;</a:t>
+            </a:r>
+            <a:endParaRPr lang="en-US" sz="2000" dirty="0">
+              <a:solidFill>
+                <a:schemeClr val="bg1"/>
+              </a:solidFill>
+            </a:endParaRPr>
+          </a:p>
+        </p:txBody>
+      </p:sp>
+      <p:sp>
+        <p:nvSpPr>
+          <p:cNvPr id="9" name="TextBox 8"/>
+          <p:cNvSpPr txBox="1"/>
+          <p:nvPr/>
+        </p:nvSpPr>
+        <p:spPr>
+          <a:xfrm>
+            <a:off x="838200" y="3886723"/>
+            <a:ext cx="5532402" cy="400110"/>
+          </a:xfrm>
+          <a:prstGeom prst="rect">
+            <a:avLst/>
+          </a:prstGeom>
+          <a:solidFill>
+            <a:schemeClr val="tx1">
+              <a:lumMod val="85000"/>
+              <a:lumOff val="15000"/>
+            </a:schemeClr>
+          </a:solidFill>
+        </p:spPr>
+        <p:txBody>
+          <a:bodyPr wrap="square" rtlCol="0">
+            <a:spAutoFit/>
+          </a:bodyPr>
+          <a:lstStyle/>
+          <a:p>
+            <a:r>
+              <a:rPr lang="en-US" sz="2000" dirty="0" smtClean="0">
+                <a:solidFill>
+                  <a:schemeClr val="bg1"/>
+                </a:solidFill>
+              </a:rPr>
+              <a:t>$ cd &lt;path to new repo&gt;</a:t>
+            </a:r>
+            <a:endParaRPr lang="en-US" sz="2000" dirty="0">
+              <a:solidFill>
+                <a:schemeClr val="bg1"/>
+              </a:solidFill>
+            </a:endParaRPr>
+          </a:p>
+        </p:txBody>
+      </p:sp>
+      <p:sp>
+        <p:nvSpPr>
+          <p:cNvPr id="10" name="TextBox 9"/>
+          <p:cNvSpPr txBox="1"/>
+          <p:nvPr/>
+        </p:nvSpPr>
+        <p:spPr>
+          <a:xfrm>
+            <a:off x="838200" y="5261622"/>
+            <a:ext cx="5532402" cy="400110"/>
+          </a:xfrm>
+          <a:prstGeom prst="rect">
+            <a:avLst/>
+          </a:prstGeom>
+          <a:solidFill>
+            <a:schemeClr val="tx1">
+              <a:lumMod val="85000"/>
+              <a:lumOff val="15000"/>
+            </a:schemeClr>
+          </a:solidFill>
+        </p:spPr>
+        <p:txBody>
+          <a:bodyPr wrap="square" rtlCol="0">
+            <a:spAutoFit/>
+          </a:bodyPr>
+          <a:lstStyle/>
+          <a:p>
+            <a:r>
+              <a:rPr lang="en-US" sz="2000" dirty="0" smtClean="0">
+                <a:solidFill>
+                  <a:schemeClr val="bg1"/>
+                </a:solidFill>
+              </a:rPr>
+              <a:t>$ </a:t>
+            </a:r>
+            <a:r>
+              <a:rPr lang="en-US" sz="2000" dirty="0" err="1" smtClean="0">
+                <a:solidFill>
+                  <a:schemeClr val="bg1"/>
+                </a:solidFill>
+              </a:rPr>
+              <a:t>git</a:t>
+            </a:r>
+            <a:r>
+              <a:rPr lang="en-US" sz="2000" dirty="0" smtClean="0">
+                <a:solidFill>
+                  <a:schemeClr val="bg1"/>
+                </a:solidFill>
+              </a:rPr>
+              <a:t> branch  &lt;branch name&gt;</a:t>
+            </a:r>
+            <a:endParaRPr lang="en-US" sz="2000" dirty="0">
+              <a:solidFill>
+                <a:schemeClr val="bg1"/>
+              </a:solidFill>
+            </a:endParaRPr>
+          </a:p>
+        </p:txBody>
+      </p:sp>
+    </p:spTree>
+    <p:extLst>
+      <p:ext uri="{BB962C8B-B14F-4D97-AF65-F5344CB8AC3E}">
+        <p14:creationId xmlns:p14="http://schemas.microsoft.com/office/powerpoint/2010/main" val="1278382332"/>
+      </p:ext>
+    </p:extLst>
+  </p:cSld>
+  <p:clrMapOvr>
+    <a:masterClrMapping/>
+  </p:clrMapOvr>
+  <p:timing>
+    <p:tnLst>
+      <p:par>
+        <p:cTn id="1" dur="indefinite" restart="never" nodeType="tmRoot"/>
+      </p:par>
+    </p:tnLst>
+  </p:timing>
+</p:sld>
+</file>
+
 <file path=ppt/slides/slide33.xml><?xml version="1.0" encoding="utf-8"?>
 <p:sld xmlns:a="http://schemas.openxmlformats.org/drawingml/2006/main" xmlns:r="http://schemas.openxmlformats.org/officeDocument/2006/relationships" xmlns:p="http://schemas.openxmlformats.org/presentationml/2006/main">
   <p:cSld>
@@ -18234,16 +18176,333 @@
           </a:p>
         </p:txBody>
       </p:sp>
+    </p:spTree>
+    <p:extLst>
+      <p:ext uri="{BB962C8B-B14F-4D97-AF65-F5344CB8AC3E}">
+        <p14:creationId xmlns:p14="http://schemas.microsoft.com/office/powerpoint/2010/main" val="733330598"/>
+      </p:ext>
+    </p:extLst>
+  </p:cSld>
+  <p:clrMapOvr>
+    <a:masterClrMapping/>
+  </p:clrMapOvr>
+  <p:timing>
+    <p:tnLst>
+      <p:par>
+        <p:cTn id="1" dur="indefinite" restart="never" nodeType="tmRoot"/>
+      </p:par>
+    </p:tnLst>
+  </p:timing>
+</p:sld>
+</file>
+
+<file path=ppt/slides/slide35.xml><?xml version="1.0" encoding="utf-8"?>
+<p:sld xmlns:a="http://schemas.openxmlformats.org/drawingml/2006/main" xmlns:r="http://schemas.openxmlformats.org/officeDocument/2006/relationships" xmlns:p="http://schemas.openxmlformats.org/presentationml/2006/main">
+  <p:cSld>
+    <p:spTree>
+      <p:nvGrpSpPr>
+        <p:cNvPr id="1" name=""/>
+        <p:cNvGrpSpPr/>
+        <p:nvPr/>
+      </p:nvGrpSpPr>
+      <p:grpSpPr>
+        <a:xfrm>
+          <a:off x="0" y="0"/>
+          <a:ext cx="0" cy="0"/>
+          <a:chOff x="0" y="0"/>
+          <a:chExt cx="0" cy="0"/>
+        </a:xfrm>
+      </p:grpSpPr>
+      <p:sp>
+        <p:nvSpPr>
+          <p:cNvPr id="2" name="Title 1"/>
+          <p:cNvSpPr>
+            <a:spLocks noGrp="1"/>
+          </p:cNvSpPr>
+          <p:nvPr>
+            <p:ph type="title"/>
+          </p:nvPr>
+        </p:nvSpPr>
+        <p:spPr>
+          <a:xfrm>
+            <a:off x="838200" y="-10006"/>
+            <a:ext cx="10515600" cy="1325563"/>
+          </a:xfrm>
+        </p:spPr>
+        <p:txBody>
+          <a:bodyPr/>
+          <a:lstStyle/>
+          <a:p>
+            <a:r>
+              <a:rPr lang="en-US" dirty="0" smtClean="0"/>
+              <a:t>Work Through an Example</a:t>
+            </a:r>
+            <a:endParaRPr lang="en-US" dirty="0"/>
+          </a:p>
+        </p:txBody>
+      </p:sp>
+      <p:sp>
+        <p:nvSpPr>
+          <p:cNvPr id="3" name="Content Placeholder 2"/>
+          <p:cNvSpPr>
+            <a:spLocks noGrp="1"/>
+          </p:cNvSpPr>
+          <p:nvPr>
+            <p:ph idx="1"/>
+          </p:nvPr>
+        </p:nvSpPr>
+        <p:spPr>
+          <a:xfrm>
+            <a:off x="838200" y="1315557"/>
+            <a:ext cx="10515600" cy="5542443"/>
+          </a:xfrm>
+        </p:spPr>
+        <p:txBody>
+          <a:bodyPr>
+            <a:noAutofit/>
+          </a:bodyPr>
+          <a:lstStyle/>
+          <a:p>
+            <a:pPr marL="0" indent="0">
+              <a:buNone/>
+            </a:pPr>
+            <a:r>
+              <a:rPr lang="en-US" sz="2400" dirty="0" smtClean="0">
+                <a:solidFill>
+                  <a:prstClr val="black"/>
+                </a:solidFill>
+              </a:rPr>
+              <a:t>Fill out the pull request</a:t>
+            </a:r>
+          </a:p>
+          <a:p>
+            <a:pPr marL="0" indent="0">
+              <a:buNone/>
+            </a:pPr>
+            <a:r>
+              <a:rPr lang="en-US" sz="2400" dirty="0" smtClean="0">
+                <a:solidFill>
+                  <a:prstClr val="black"/>
+                </a:solidFill>
+              </a:rPr>
+              <a:t>Press the “Create Pull Request” button</a:t>
+            </a:r>
+          </a:p>
+          <a:p>
+            <a:pPr marL="0" indent="0">
+              <a:buNone/>
+            </a:pPr>
+            <a:endParaRPr lang="en-US" sz="2400" dirty="0" smtClean="0">
+              <a:solidFill>
+                <a:prstClr val="black"/>
+              </a:solidFill>
+            </a:endParaRPr>
+          </a:p>
+          <a:p>
+            <a:pPr marL="0" indent="0">
+              <a:buNone/>
+            </a:pPr>
+            <a:r>
+              <a:rPr lang="en-US" sz="2400" dirty="0" smtClean="0">
+                <a:solidFill>
+                  <a:prstClr val="black"/>
+                </a:solidFill>
+              </a:rPr>
+              <a:t>This will take you to a screen with different tabs about the pull request</a:t>
+            </a:r>
+          </a:p>
+          <a:p>
+            <a:pPr marL="0" indent="0">
+              <a:buNone/>
+            </a:pPr>
+            <a:r>
+              <a:rPr lang="en-US" sz="2400" dirty="0">
+                <a:solidFill>
+                  <a:prstClr val="black"/>
+                </a:solidFill>
+              </a:rPr>
+              <a:t>	</a:t>
+            </a:r>
+            <a:r>
+              <a:rPr lang="en-US" sz="2400" dirty="0" smtClean="0">
+                <a:solidFill>
+                  <a:prstClr val="black"/>
+                </a:solidFill>
+              </a:rPr>
+              <a:t>Conversation</a:t>
+            </a:r>
+          </a:p>
+          <a:p>
+            <a:pPr marL="0" indent="0">
+              <a:buNone/>
+            </a:pPr>
+            <a:r>
+              <a:rPr lang="en-US" sz="2400" dirty="0">
+                <a:solidFill>
+                  <a:prstClr val="black"/>
+                </a:solidFill>
+              </a:rPr>
+              <a:t>	</a:t>
+            </a:r>
+            <a:r>
+              <a:rPr lang="en-US" sz="2400" dirty="0" smtClean="0">
+                <a:solidFill>
+                  <a:prstClr val="black"/>
+                </a:solidFill>
+              </a:rPr>
+              <a:t>Commits</a:t>
+            </a:r>
+          </a:p>
+          <a:p>
+            <a:pPr marL="0" indent="0">
+              <a:buNone/>
+            </a:pPr>
+            <a:r>
+              <a:rPr lang="en-US" sz="2400" dirty="0">
+                <a:solidFill>
+                  <a:prstClr val="black"/>
+                </a:solidFill>
+              </a:rPr>
+              <a:t>	</a:t>
+            </a:r>
+            <a:r>
+              <a:rPr lang="en-US" sz="2400" dirty="0" smtClean="0">
+                <a:solidFill>
+                  <a:prstClr val="black"/>
+                </a:solidFill>
+              </a:rPr>
+              <a:t>Files changed</a:t>
+            </a:r>
+            <a:r>
+              <a:rPr lang="en-US" sz="2400" dirty="0">
+                <a:solidFill>
+                  <a:prstClr val="black"/>
+                </a:solidFill>
+              </a:rPr>
+              <a:t>	</a:t>
+            </a:r>
+            <a:endParaRPr lang="en-US" sz="2400" dirty="0" smtClean="0">
+              <a:solidFill>
+                <a:prstClr val="black"/>
+              </a:solidFill>
+            </a:endParaRPr>
+          </a:p>
+          <a:p>
+            <a:pPr marL="0" indent="0">
+              <a:buNone/>
+            </a:pPr>
+            <a:r>
+              <a:rPr lang="en-US" sz="2400" dirty="0" smtClean="0">
+                <a:solidFill>
+                  <a:prstClr val="black"/>
+                </a:solidFill>
+              </a:rPr>
+              <a:t>Notice the link “command line instructions” </a:t>
+            </a:r>
+          </a:p>
+          <a:p>
+            <a:pPr marL="0" indent="0">
+              <a:buNone/>
+            </a:pPr>
+            <a:r>
+              <a:rPr lang="en-US" sz="2400" dirty="0">
+                <a:solidFill>
+                  <a:prstClr val="black"/>
+                </a:solidFill>
+              </a:rPr>
+              <a:t>	</a:t>
+            </a:r>
+            <a:r>
+              <a:rPr lang="en-US" sz="2400" dirty="0" smtClean="0">
+                <a:solidFill>
+                  <a:prstClr val="black"/>
+                </a:solidFill>
+              </a:rPr>
+              <a:t>If you can’t automatically merge, this link will give you options on how to 	deals with any merge conflicts </a:t>
+            </a:r>
+          </a:p>
+          <a:p>
+            <a:pPr marL="0" indent="0">
+              <a:buNone/>
+            </a:pPr>
+            <a:endParaRPr lang="en-US" sz="2400" dirty="0" smtClean="0">
+              <a:solidFill>
+                <a:prstClr val="black"/>
+              </a:solidFill>
+            </a:endParaRPr>
+          </a:p>
+          <a:p>
+            <a:pPr marL="0" indent="0">
+              <a:buNone/>
+            </a:pPr>
+            <a:r>
+              <a:rPr lang="en-US" sz="2400" dirty="0" smtClean="0">
+                <a:solidFill>
+                  <a:prstClr val="black"/>
+                </a:solidFill>
+              </a:rPr>
+              <a:t>Last thing is to Merge pull request (and the confirm)</a:t>
+            </a:r>
+          </a:p>
+          <a:p>
+            <a:pPr marL="0" indent="0">
+              <a:buNone/>
+            </a:pPr>
+            <a:r>
+              <a:rPr lang="en-US" sz="2400" dirty="0" smtClean="0">
+                <a:solidFill>
+                  <a:prstClr val="black"/>
+                </a:solidFill>
+              </a:rPr>
+              <a:t>	</a:t>
+            </a:r>
+          </a:p>
+          <a:p>
+            <a:pPr marL="0" lvl="0" indent="0">
+              <a:buNone/>
+            </a:pPr>
+            <a:endParaRPr lang="en-US" sz="2400" dirty="0">
+              <a:solidFill>
+                <a:prstClr val="black"/>
+              </a:solidFill>
+            </a:endParaRPr>
+          </a:p>
+          <a:p>
+            <a:pPr marL="0" lvl="0" indent="0">
+              <a:buNone/>
+            </a:pPr>
+            <a:endParaRPr lang="en-US" sz="3600" b="1" dirty="0" smtClean="0"/>
+          </a:p>
+          <a:p>
+            <a:pPr marL="0" lvl="0" indent="0">
+              <a:buNone/>
+            </a:pPr>
+            <a:endParaRPr lang="en-US" sz="3200" b="1" dirty="0"/>
+          </a:p>
+          <a:p>
+            <a:pPr marL="0" indent="0">
+              <a:buNone/>
+            </a:pPr>
+            <a:endParaRPr lang="en-US" sz="3200" b="1" dirty="0" smtClean="0"/>
+          </a:p>
+          <a:p>
+            <a:pPr marL="0" indent="0">
+              <a:buNone/>
+            </a:pPr>
+            <a:endParaRPr lang="en-US" sz="1800" dirty="0" smtClean="0"/>
+          </a:p>
+        </p:txBody>
+      </p:sp>
       <p:pic>
         <p:nvPicPr>
-          <p:cNvPr id="5" name="Picture 4"/>
+          <p:cNvPr id="4" name="Picture 3"/>
           <p:cNvPicPr>
             <a:picLocks noChangeAspect="1"/>
           </p:cNvPicPr>
           <p:nvPr/>
         </p:nvPicPr>
         <p:blipFill>
-          <a:blip r:embed="rId4">
+          <a:blip r:embed="rId3">
             <a:extLst>
               <a:ext uri="{28A0092B-C50C-407E-A947-70E740481C1C}">
                 <a14:useLocalDpi xmlns:a14="http://schemas.microsoft.com/office/drawing/2010/main" val="0"/>
@@ -18256,7 +18515,7 @@
         </p:blipFill>
         <p:spPr>
           <a:xfrm>
-            <a:off x="0" y="5901962"/>
+            <a:off x="75801" y="447276"/>
             <a:ext cx="12116199" cy="6901175"/>
           </a:xfrm>
           <a:prstGeom prst="rect">
@@ -18267,7 +18526,7 @@
     </p:spTree>
     <p:extLst>
       <p:ext uri="{BB962C8B-B14F-4D97-AF65-F5344CB8AC3E}">
-        <p14:creationId xmlns:p14="http://schemas.microsoft.com/office/powerpoint/2010/main" val="733330598"/>
+        <p14:creationId xmlns:p14="http://schemas.microsoft.com/office/powerpoint/2010/main" val="2425585757"/>
       </p:ext>
     </p:extLst>
   </p:cSld>
@@ -18308,7 +18567,7 @@
                                           </p:stCondLst>
                                         </p:cTn>
                                         <p:tgtEl>
-                                          <p:spTgt spid="5"/>
+                                          <p:spTgt spid="4"/>
                                         </p:tgtEl>
                                         <p:attrNameLst>
                                           <p:attrName>style.visibility</p:attrName>
@@ -18316,6 +18575,51 @@
                                       </p:cBhvr>
                                       <p:to>
                                         <p:strVal val="visible"/>
+                                      </p:to>
+                                    </p:set>
+                                  </p:childTnLst>
+                                </p:cTn>
+                              </p:par>
+                            </p:childTnLst>
+                          </p:cTn>
+                        </p:par>
+                      </p:childTnLst>
+                    </p:cTn>
+                  </p:par>
+                  <p:par>
+                    <p:cTn id="7" fill="hold">
+                      <p:stCondLst>
+                        <p:cond delay="indefinite"/>
+                      </p:stCondLst>
+                      <p:childTnLst>
+                        <p:par>
+                          <p:cTn id="8" fill="hold">
+                            <p:stCondLst>
+                              <p:cond delay="0"/>
+                            </p:stCondLst>
+                            <p:childTnLst>
+                              <p:par>
+                                <p:cTn id="9" presetID="1" presetClass="exit" presetSubtype="0" fill="hold" nodeType="clickEffect">
+                                  <p:stCondLst>
+                                    <p:cond delay="0"/>
+                                  </p:stCondLst>
+                                  <p:childTnLst>
+                                    <p:set>
+                                      <p:cBhvr>
+                                        <p:cTn id="10" dur="1" fill="hold">
+                                          <p:stCondLst>
+                                            <p:cond delay="0"/>
+                                          </p:stCondLst>
+                                        </p:cTn>
+                                        <p:tgtEl>
+                                          <p:spTgt spid="4"/>
+                                        </p:tgtEl>
+                                        <p:attrNameLst>
+                                          <p:attrName>style.visibility</p:attrName>
+                                        </p:attrNameLst>
+                                      </p:cBhvr>
+                                      <p:to>
+                                        <p:strVal val="hidden"/>
                                       </p:to>
                                     </p:set>
                                   </p:childTnLst>
@@ -18352,323 +18656,6 @@
 </p:sld>
 </file>
 
-<file path=ppt/slides/slide35.xml><?xml version="1.0" encoding="utf-8"?>
-<p:sld xmlns:a="http://schemas.openxmlformats.org/drawingml/2006/main" xmlns:r="http://schemas.openxmlformats.org/officeDocument/2006/relationships" xmlns:p="http://schemas.openxmlformats.org/presentationml/2006/main">
-  <p:cSld>
-    <p:spTree>
-      <p:nvGrpSpPr>
-        <p:cNvPr id="1" name=""/>
-        <p:cNvGrpSpPr/>
-        <p:nvPr/>
-      </p:nvGrpSpPr>
-      <p:grpSpPr>
-        <a:xfrm>
-          <a:off x="0" y="0"/>
-          <a:ext cx="0" cy="0"/>
-          <a:chOff x="0" y="0"/>
-          <a:chExt cx="0" cy="0"/>
-        </a:xfrm>
-      </p:grpSpPr>
-      <p:sp>
-        <p:nvSpPr>
-          <p:cNvPr id="2" name="Title 1"/>
-          <p:cNvSpPr>
-            <a:spLocks noGrp="1"/>
-          </p:cNvSpPr>
-          <p:nvPr>
-            <p:ph type="title"/>
-          </p:nvPr>
-        </p:nvSpPr>
-        <p:spPr>
-          <a:xfrm>
-            <a:off x="838200" y="-10006"/>
-            <a:ext cx="10515600" cy="1325563"/>
-          </a:xfrm>
-        </p:spPr>
-        <p:txBody>
-          <a:bodyPr/>
-          <a:lstStyle/>
-          <a:p>
-            <a:r>
-              <a:rPr lang="en-US" dirty="0" smtClean="0"/>
-              <a:t>Work Through an Example</a:t>
-            </a:r>
-            <a:endParaRPr lang="en-US" dirty="0"/>
-          </a:p>
-        </p:txBody>
-      </p:sp>
-      <p:sp>
-        <p:nvSpPr>
-          <p:cNvPr id="3" name="Content Placeholder 2"/>
-          <p:cNvSpPr>
-            <a:spLocks noGrp="1"/>
-          </p:cNvSpPr>
-          <p:nvPr>
-            <p:ph idx="1"/>
-          </p:nvPr>
-        </p:nvSpPr>
-        <p:spPr>
-          <a:xfrm>
-            <a:off x="838200" y="1315557"/>
-            <a:ext cx="10515600" cy="5542443"/>
-          </a:xfrm>
-        </p:spPr>
-        <p:txBody>
-          <a:bodyPr>
-            <a:noAutofit/>
-          </a:bodyPr>
-          <a:lstStyle/>
-          <a:p>
-            <a:pPr marL="0" indent="0">
-              <a:buNone/>
-            </a:pPr>
-            <a:r>
-              <a:rPr lang="en-US" sz="2400" dirty="0" smtClean="0">
-                <a:solidFill>
-                  <a:prstClr val="black"/>
-                </a:solidFill>
-              </a:rPr>
-              <a:t>Fill out the pull request</a:t>
-            </a:r>
-          </a:p>
-          <a:p>
-            <a:pPr marL="0" indent="0">
-              <a:buNone/>
-            </a:pPr>
-            <a:r>
-              <a:rPr lang="en-US" sz="2400" dirty="0" smtClean="0">
-                <a:solidFill>
-                  <a:prstClr val="black"/>
-                </a:solidFill>
-              </a:rPr>
-              <a:t>Press the “Create Pull Request” button</a:t>
-            </a:r>
-          </a:p>
-          <a:p>
-            <a:pPr marL="0" indent="0">
-              <a:buNone/>
-            </a:pPr>
-            <a:endParaRPr lang="en-US" sz="2400" dirty="0" smtClean="0">
-              <a:solidFill>
-                <a:prstClr val="black"/>
-              </a:solidFill>
-            </a:endParaRPr>
-          </a:p>
-          <a:p>
-            <a:pPr marL="0" indent="0">
-              <a:buNone/>
-            </a:pPr>
-            <a:r>
-              <a:rPr lang="en-US" sz="2400" dirty="0" smtClean="0">
-                <a:solidFill>
-                  <a:prstClr val="black"/>
-                </a:solidFill>
-              </a:rPr>
-              <a:t>This will take you to a screen with different tabs about the pull request</a:t>
-            </a:r>
-          </a:p>
-          <a:p>
-            <a:pPr marL="0" indent="0">
-              <a:buNone/>
-            </a:pPr>
-            <a:r>
-              <a:rPr lang="en-US" sz="2400" dirty="0">
-                <a:solidFill>
-                  <a:prstClr val="black"/>
-                </a:solidFill>
-              </a:rPr>
-              <a:t>	</a:t>
-            </a:r>
-            <a:r>
-              <a:rPr lang="en-US" sz="2400" dirty="0" smtClean="0">
-                <a:solidFill>
-                  <a:prstClr val="black"/>
-                </a:solidFill>
-              </a:rPr>
-              <a:t>Conversation</a:t>
-            </a:r>
-          </a:p>
-          <a:p>
-            <a:pPr marL="0" indent="0">
-              <a:buNone/>
-            </a:pPr>
-            <a:r>
-              <a:rPr lang="en-US" sz="2400" dirty="0">
-                <a:solidFill>
-                  <a:prstClr val="black"/>
-                </a:solidFill>
-              </a:rPr>
-              <a:t>	</a:t>
-            </a:r>
-            <a:r>
-              <a:rPr lang="en-US" sz="2400" dirty="0" smtClean="0">
-                <a:solidFill>
-                  <a:prstClr val="black"/>
-                </a:solidFill>
-              </a:rPr>
-              <a:t>Commits</a:t>
-            </a:r>
-          </a:p>
-          <a:p>
-            <a:pPr marL="0" indent="0">
-              <a:buNone/>
-            </a:pPr>
-            <a:r>
-              <a:rPr lang="en-US" sz="2400" dirty="0">
-                <a:solidFill>
-                  <a:prstClr val="black"/>
-                </a:solidFill>
-              </a:rPr>
-              <a:t>	</a:t>
-            </a:r>
-            <a:r>
-              <a:rPr lang="en-US" sz="2400" dirty="0" smtClean="0">
-                <a:solidFill>
-                  <a:prstClr val="black"/>
-                </a:solidFill>
-              </a:rPr>
-              <a:t>Files changed</a:t>
-            </a:r>
-            <a:r>
-              <a:rPr lang="en-US" sz="2400" dirty="0">
-                <a:solidFill>
-                  <a:prstClr val="black"/>
-                </a:solidFill>
-              </a:rPr>
-              <a:t>	</a:t>
-            </a:r>
-            <a:endParaRPr lang="en-US" sz="2400" dirty="0" smtClean="0">
-              <a:solidFill>
-                <a:prstClr val="black"/>
-              </a:solidFill>
-            </a:endParaRPr>
-          </a:p>
-          <a:p>
-            <a:pPr marL="0" indent="0">
-              <a:buNone/>
-            </a:pPr>
-            <a:r>
-              <a:rPr lang="en-US" sz="2400" dirty="0" smtClean="0">
-                <a:solidFill>
-                  <a:prstClr val="black"/>
-                </a:solidFill>
-              </a:rPr>
-              <a:t>Notice the link “command line instructions” </a:t>
-            </a:r>
-          </a:p>
-          <a:p>
-            <a:pPr marL="0" indent="0">
-              <a:buNone/>
-            </a:pPr>
-            <a:r>
-              <a:rPr lang="en-US" sz="2400" dirty="0">
-                <a:solidFill>
-                  <a:prstClr val="black"/>
-                </a:solidFill>
-              </a:rPr>
-              <a:t>	</a:t>
-            </a:r>
-            <a:r>
-              <a:rPr lang="en-US" sz="2400" dirty="0" smtClean="0">
-                <a:solidFill>
-                  <a:prstClr val="black"/>
-                </a:solidFill>
-              </a:rPr>
-              <a:t>If you can’t automatically merge, this link will give you options on how to 	deals with any merge conflicts </a:t>
-            </a:r>
-          </a:p>
-          <a:p>
-            <a:pPr marL="0" indent="0">
-              <a:buNone/>
-            </a:pPr>
-            <a:endParaRPr lang="en-US" sz="2400" dirty="0" smtClean="0">
-              <a:solidFill>
-                <a:prstClr val="black"/>
-              </a:solidFill>
-            </a:endParaRPr>
-          </a:p>
-          <a:p>
-            <a:pPr marL="0" indent="0">
-              <a:buNone/>
-            </a:pPr>
-            <a:r>
-              <a:rPr lang="en-US" sz="2400" dirty="0" smtClean="0">
-                <a:solidFill>
-                  <a:prstClr val="black"/>
-                </a:solidFill>
-              </a:rPr>
-              <a:t>Last thing is to Merge pull request (and the confirm)</a:t>
-            </a:r>
-          </a:p>
-          <a:p>
-            <a:pPr marL="0" indent="0">
-              <a:buNone/>
-            </a:pPr>
-            <a:r>
-              <a:rPr lang="en-US" sz="2400" dirty="0" smtClean="0">
-                <a:solidFill>
-                  <a:prstClr val="black"/>
-                </a:solidFill>
-              </a:rPr>
-              <a:t>	</a:t>
-            </a:r>
-          </a:p>
-          <a:p>
-            <a:pPr marL="0" lvl="0" indent="0">
-              <a:buNone/>
-            </a:pPr>
-            <a:endParaRPr lang="en-US" sz="2400" dirty="0">
-              <a:solidFill>
-                <a:prstClr val="black"/>
-              </a:solidFill>
-            </a:endParaRPr>
-          </a:p>
-          <a:p>
-            <a:pPr marL="0" lvl="0" indent="0">
-              <a:buNone/>
-            </a:pPr>
-            <a:endParaRPr lang="en-US" sz="3600" b="1" dirty="0" smtClean="0"/>
-          </a:p>
-          <a:p>
-            <a:pPr marL="0" lvl="0" indent="0">
-              <a:buNone/>
-            </a:pPr>
-            <a:endParaRPr lang="en-US" sz="3200" b="1" dirty="0"/>
-          </a:p>
-          <a:p>
-            <a:pPr marL="0" indent="0">
-              <a:buNone/>
-            </a:pPr>
-            <a:endParaRPr lang="en-US" sz="3200" b="1" dirty="0" smtClean="0"/>
-          </a:p>
-          <a:p>
-            <a:pPr marL="0" indent="0">
-              <a:buNone/>
-            </a:pPr>
-            <a:endParaRPr lang="en-US" sz="1800" dirty="0" smtClean="0"/>
-          </a:p>
-        </p:txBody>
-      </p:sp>
-    </p:spTree>
-    <p:extLst>
-      <p:ext uri="{BB962C8B-B14F-4D97-AF65-F5344CB8AC3E}">
-        <p14:creationId xmlns:p14="http://schemas.microsoft.com/office/powerpoint/2010/main" val="2425585757"/>
-      </p:ext>
-    </p:extLst>
-  </p:cSld>
-  <p:clrMapOvr>
-    <a:masterClrMapping/>
-  </p:clrMapOvr>
-  <p:timing>
-    <p:tnLst>
-      <p:par>
-        <p:cTn id="1" dur="indefinite" restart="never" nodeType="tmRoot"/>
-      </p:par>
-    </p:tnLst>
-  </p:timing>
-</p:sld>
-</file>
-
 <file path=ppt/slides/slide36.xml><?xml version="1.0" encoding="utf-8"?>
 <p:sld xmlns:a="http://schemas.openxmlformats.org/drawingml/2006/main" xmlns:r="http://schemas.openxmlformats.org/officeDocument/2006/relationships" xmlns:p="http://schemas.openxmlformats.org/presentationml/2006/main">
   <p:cSld>
@@ -18738,6 +18725,13 @@
   <p:clrMapOvr>
     <a:masterClrMapping/>
   </p:clrMapOvr>
+  <p:timing>
+    <p:tnLst>
+      <p:par>
+        <p:cTn id="1" dur="indefinite" restart="never" nodeType="tmRoot"/>
+      </p:par>
+    </p:tnLst>
+  </p:timing>
 </p:sld>
 </file>
 
@@ -18768,6 +18762,338 @@
             <p:ph type="title"/>
           </p:nvPr>
         </p:nvSpPr>
+        <p:spPr>
+          <a:xfrm>
+            <a:off x="838200" y="-10006"/>
+            <a:ext cx="10515600" cy="1325563"/>
+          </a:xfrm>
+        </p:spPr>
+        <p:txBody>
+          <a:bodyPr/>
+          <a:lstStyle/>
+          <a:p>
+            <a:r>
+              <a:rPr lang="en-US" dirty="0" smtClean="0"/>
+              <a:t>Practice</a:t>
+            </a:r>
+            <a:endParaRPr lang="en-US" dirty="0"/>
+          </a:p>
+        </p:txBody>
+      </p:sp>
+      <p:sp>
+        <p:nvSpPr>
+          <p:cNvPr id="5" name="Content Placeholder 2"/>
+          <p:cNvSpPr>
+            <a:spLocks noGrp="1"/>
+          </p:cNvSpPr>
+          <p:nvPr>
+            <p:ph idx="1"/>
+          </p:nvPr>
+        </p:nvSpPr>
+        <p:spPr>
+          <a:xfrm>
+            <a:off x="838200" y="1315557"/>
+            <a:ext cx="10515600" cy="4308003"/>
+          </a:xfrm>
+        </p:spPr>
+        <p:txBody>
+          <a:bodyPr>
+            <a:noAutofit/>
+          </a:bodyPr>
+          <a:lstStyle/>
+          <a:p>
+            <a:pPr marL="514350" indent="-514350">
+              <a:buAutoNum type="arabicPeriod"/>
+            </a:pPr>
+            <a:r>
+              <a:rPr lang="en-US" sz="3200" b="1" dirty="0" smtClean="0"/>
+              <a:t>Make a new repo, or find a repo on GitHub</a:t>
+            </a:r>
+          </a:p>
+          <a:p>
+            <a:pPr marL="514350" indent="-514350">
+              <a:buAutoNum type="arabicPeriod"/>
+            </a:pPr>
+            <a:r>
+              <a:rPr lang="en-US" sz="3200" b="1" dirty="0" smtClean="0"/>
+              <a:t>Clone that repo using </a:t>
+            </a:r>
+            <a:r>
+              <a:rPr lang="en-US" sz="3200" b="1" dirty="0" err="1" smtClean="0"/>
+              <a:t>git</a:t>
+            </a:r>
+            <a:endParaRPr lang="en-US" sz="3200" b="1" dirty="0" smtClean="0"/>
+          </a:p>
+          <a:p>
+            <a:pPr marL="0" indent="0">
+              <a:buNone/>
+            </a:pPr>
+            <a:r>
+              <a:rPr lang="en-US" sz="3200" b="1" dirty="0"/>
+              <a:t>3</a:t>
+            </a:r>
+            <a:r>
+              <a:rPr lang="en-US" sz="3200" b="1" dirty="0" smtClean="0"/>
+              <a:t>. </a:t>
+            </a:r>
+            <a:r>
+              <a:rPr lang="en-US" sz="3200" b="1" dirty="0" smtClean="0"/>
+              <a:t>Create </a:t>
+            </a:r>
+            <a:r>
+              <a:rPr lang="en-US" sz="3200" b="1" dirty="0" smtClean="0"/>
+              <a:t>a </a:t>
+            </a:r>
+            <a:r>
+              <a:rPr lang="en-US" sz="3200" b="1" dirty="0"/>
+              <a:t>branch from </a:t>
+            </a:r>
+            <a:r>
+              <a:rPr lang="en-US" sz="3200" b="1" dirty="0" smtClean="0"/>
+              <a:t>master (of your new repo).</a:t>
+            </a:r>
+            <a:endParaRPr lang="en-US" sz="3200" b="1" dirty="0"/>
+          </a:p>
+          <a:p>
+            <a:pPr marL="0" indent="0">
+              <a:buNone/>
+            </a:pPr>
+            <a:r>
+              <a:rPr lang="en-US" sz="3200" b="1" dirty="0"/>
+              <a:t>4</a:t>
+            </a:r>
+            <a:r>
+              <a:rPr lang="en-US" sz="3200" b="1" dirty="0" smtClean="0"/>
+              <a:t>. </a:t>
+            </a:r>
+            <a:r>
+              <a:rPr lang="en-US" sz="3200" b="1" dirty="0"/>
+              <a:t>Make some commits to improve the project.</a:t>
+            </a:r>
+          </a:p>
+          <a:p>
+            <a:pPr marL="0" indent="0">
+              <a:buNone/>
+            </a:pPr>
+            <a:r>
+              <a:rPr lang="en-US" sz="3200" b="1" dirty="0"/>
+              <a:t>5</a:t>
+            </a:r>
+            <a:r>
+              <a:rPr lang="en-US" sz="3200" b="1" dirty="0" smtClean="0"/>
+              <a:t>. </a:t>
+            </a:r>
+            <a:r>
+              <a:rPr lang="en-US" sz="3200" b="1" dirty="0"/>
+              <a:t>Push this branch to your GitHub </a:t>
+            </a:r>
+            <a:r>
+              <a:rPr lang="en-US" sz="3200" b="1" dirty="0" smtClean="0"/>
+              <a:t>.</a:t>
+            </a:r>
+            <a:endParaRPr lang="en-US" sz="3200" b="1" dirty="0"/>
+          </a:p>
+          <a:p>
+            <a:pPr marL="0" indent="0">
+              <a:buNone/>
+            </a:pPr>
+            <a:r>
+              <a:rPr lang="en-US" sz="3200" b="1" dirty="0"/>
+              <a:t>6</a:t>
+            </a:r>
+            <a:r>
+              <a:rPr lang="en-US" sz="3200" b="1" dirty="0" smtClean="0"/>
+              <a:t>. </a:t>
+            </a:r>
+            <a:r>
+              <a:rPr lang="en-US" sz="3200" b="1" dirty="0"/>
+              <a:t>Open a Pull Request on GitHub.</a:t>
+            </a:r>
+          </a:p>
+          <a:p>
+            <a:pPr marL="0" indent="0">
+              <a:buNone/>
+            </a:pPr>
+            <a:r>
+              <a:rPr lang="en-US" sz="3200" b="1" dirty="0">
+                <a:solidFill>
+                  <a:schemeClr val="tx1">
+                    <a:lumMod val="65000"/>
+                    <a:lumOff val="35000"/>
+                  </a:schemeClr>
+                </a:solidFill>
+              </a:rPr>
+              <a:t>7</a:t>
+            </a:r>
+            <a:r>
+              <a:rPr lang="en-US" sz="3200" b="1" dirty="0" smtClean="0">
+                <a:solidFill>
+                  <a:schemeClr val="tx1">
+                    <a:lumMod val="65000"/>
+                    <a:lumOff val="35000"/>
+                  </a:schemeClr>
+                </a:solidFill>
+              </a:rPr>
+              <a:t>. </a:t>
+            </a:r>
+            <a:r>
+              <a:rPr lang="en-US" sz="3200" b="1" dirty="0">
+                <a:solidFill>
+                  <a:schemeClr val="tx1">
+                    <a:lumMod val="65000"/>
+                    <a:lumOff val="35000"/>
+                  </a:schemeClr>
+                </a:solidFill>
+              </a:rPr>
+              <a:t>Discuss, and optionally continue committing.</a:t>
+            </a:r>
+          </a:p>
+          <a:p>
+            <a:pPr marL="0" indent="0">
+              <a:buNone/>
+            </a:pPr>
+            <a:r>
+              <a:rPr lang="en-US" sz="3200" b="1" dirty="0">
+                <a:solidFill>
+                  <a:schemeClr val="tx1">
+                    <a:lumMod val="65000"/>
+                    <a:lumOff val="35000"/>
+                  </a:schemeClr>
+                </a:solidFill>
+              </a:rPr>
+              <a:t>8</a:t>
+            </a:r>
+            <a:r>
+              <a:rPr lang="en-US" sz="3200" b="1" dirty="0" smtClean="0">
+                <a:solidFill>
+                  <a:schemeClr val="tx1">
+                    <a:lumMod val="65000"/>
+                    <a:lumOff val="35000"/>
+                  </a:schemeClr>
+                </a:solidFill>
+              </a:rPr>
+              <a:t>. </a:t>
+            </a:r>
+            <a:r>
+              <a:rPr lang="en-US" sz="3200" b="1" dirty="0">
+                <a:solidFill>
+                  <a:schemeClr val="tx1">
+                    <a:lumMod val="65000"/>
+                    <a:lumOff val="35000"/>
+                  </a:schemeClr>
+                </a:solidFill>
+              </a:rPr>
+              <a:t>The project owner merges or closes the Pull </a:t>
+            </a:r>
+            <a:r>
+              <a:rPr lang="en-US" sz="3200" b="1" dirty="0" smtClean="0">
+                <a:solidFill>
+                  <a:schemeClr val="tx1">
+                    <a:lumMod val="65000"/>
+                    <a:lumOff val="35000"/>
+                  </a:schemeClr>
+                </a:solidFill>
+              </a:rPr>
+              <a:t>Request.</a:t>
+            </a:r>
+          </a:p>
+          <a:p>
+            <a:pPr marL="0" indent="0">
+              <a:buNone/>
+            </a:pPr>
+            <a:r>
+              <a:rPr lang="en-US" sz="2400" dirty="0" smtClean="0">
+                <a:solidFill>
+                  <a:prstClr val="black"/>
+                </a:solidFill>
+              </a:rPr>
+              <a:t>         </a:t>
+            </a:r>
+            <a:endParaRPr lang="en-US" sz="2400" dirty="0"/>
+          </a:p>
+          <a:p>
+            <a:pPr marL="0" lvl="0" indent="0">
+              <a:buNone/>
+            </a:pPr>
+            <a:endParaRPr lang="en-US" sz="2400" dirty="0">
+              <a:solidFill>
+                <a:prstClr val="black"/>
+              </a:solidFill>
+            </a:endParaRPr>
+          </a:p>
+          <a:p>
+            <a:pPr marL="0" lvl="0" indent="0">
+              <a:buNone/>
+            </a:pPr>
+            <a:endParaRPr lang="en-US" sz="3600" b="1" dirty="0" smtClean="0"/>
+          </a:p>
+          <a:p>
+            <a:pPr marL="0" lvl="0" indent="0">
+              <a:buNone/>
+            </a:pPr>
+            <a:endParaRPr lang="en-US" sz="3200" b="1" dirty="0"/>
+          </a:p>
+          <a:p>
+            <a:pPr marL="0" indent="0">
+              <a:buNone/>
+            </a:pPr>
+            <a:endParaRPr lang="en-US" sz="3200" b="1" dirty="0" smtClean="0"/>
+          </a:p>
+          <a:p>
+            <a:pPr marL="0" indent="0">
+              <a:buNone/>
+            </a:pPr>
+            <a:endParaRPr lang="en-US" sz="1800" dirty="0" smtClean="0"/>
+          </a:p>
+        </p:txBody>
+      </p:sp>
+    </p:spTree>
+    <p:extLst>
+      <p:ext uri="{BB962C8B-B14F-4D97-AF65-F5344CB8AC3E}">
+        <p14:creationId xmlns:p14="http://schemas.microsoft.com/office/powerpoint/2010/main" val="1503620994"/>
+      </p:ext>
+    </p:extLst>
+  </p:cSld>
+  <p:clrMapOvr>
+    <a:masterClrMapping/>
+  </p:clrMapOvr>
+  <p:timing>
+    <p:tnLst>
+      <p:par>
+        <p:cTn id="1" dur="indefinite" restart="never" nodeType="tmRoot"/>
+      </p:par>
+    </p:tnLst>
+  </p:timing>
+</p:sld>
+</file>
+
+<file path=ppt/slides/slide38.xml><?xml version="1.0" encoding="utf-8"?>
+<p:sld xmlns:a="http://schemas.openxmlformats.org/drawingml/2006/main" xmlns:r="http://schemas.openxmlformats.org/officeDocument/2006/relationships" xmlns:p="http://schemas.openxmlformats.org/presentationml/2006/main">
+  <p:cSld>
+    <p:spTree>
+      <p:nvGrpSpPr>
+        <p:cNvPr id="1" name=""/>
+        <p:cNvGrpSpPr/>
+        <p:nvPr/>
+      </p:nvGrpSpPr>
+      <p:grpSpPr>
+        <a:xfrm>
+          <a:off x="0" y="0"/>
+          <a:ext cx="0" cy="0"/>
+          <a:chOff x="0" y="0"/>
+          <a:chExt cx="0" cy="0"/>
+        </a:xfrm>
+      </p:grpSpPr>
+      <p:sp>
+        <p:nvSpPr>
+          <p:cNvPr id="2" name="Title 1"/>
+          <p:cNvSpPr>
+            <a:spLocks noGrp="1"/>
+          </p:cNvSpPr>
+          <p:nvPr>
+            <p:ph type="title"/>
+          </p:nvPr>
+        </p:nvSpPr>
         <p:spPr/>
         <p:txBody>
           <a:bodyPr/>
@@ -18869,6 +19195,13 @@
   <p:clrMapOvr>
     <a:masterClrMapping/>
   </p:clrMapOvr>
+  <p:timing>
+    <p:tnLst>
+      <p:par>
+        <p:cTn id="1" dur="indefinite" restart="never" nodeType="tmRoot"/>
+      </p:par>
+    </p:tnLst>
+  </p:timing>
 </p:sld>
 </file>
 
@@ -18911,11 +19244,7 @@
           <a:p>
             <a:r>
               <a:rPr lang="en-US" dirty="0" smtClean="0"/>
-              <a:t> </a:t>
-            </a:r>
-            <a:r>
-              <a:rPr lang="en-US" dirty="0" smtClean="0"/>
-              <a:t>What this Class Will Go Over</a:t>
+              <a:t> What this Class Will Go Over</a:t>
             </a:r>
             <a:endParaRPr lang="en-US" dirty="0"/>
           </a:p>
@@ -18976,11 +19305,7 @@
             </a:pPr>
             <a:r>
               <a:rPr lang="en-US" dirty="0" smtClean="0"/>
-              <a:t>Manage documents </a:t>
-            </a:r>
-            <a:r>
-              <a:rPr lang="en-US" dirty="0" smtClean="0"/>
-              <a:t>using </a:t>
+              <a:t>Manage documents using </a:t>
             </a:r>
             <a:r>
               <a:rPr lang="en-US" dirty="0" err="1" smtClean="0"/>
@@ -19266,15 +19591,7 @@
             <a:pPr lvl="1"/>
             <a:r>
               <a:rPr lang="en-US" dirty="0" smtClean="0"/>
-              <a:t>Internet </a:t>
-            </a:r>
-            <a:r>
-              <a:rPr lang="en-US" dirty="0" smtClean="0"/>
-              <a:t>based service </a:t>
-            </a:r>
-            <a:r>
-              <a:rPr lang="en-US" dirty="0" smtClean="0"/>
-              <a:t>developed by the good people of </a:t>
+              <a:t>Internet based service developed by the good people of </a:t>
             </a:r>
             <a:r>
               <a:rPr lang="en-US" dirty="0" err="1" smtClean="0"/>
@@ -19293,11 +19610,7 @@
             <a:pPr lvl="1"/>
             <a:r>
               <a:rPr lang="en-US" dirty="0" smtClean="0"/>
-              <a:t>Can be </a:t>
-            </a:r>
-            <a:r>
-              <a:rPr lang="en-US" dirty="0" smtClean="0"/>
-              <a:t>used with </a:t>
+              <a:t>Can be used with </a:t>
             </a:r>
             <a:r>
               <a:rPr lang="en-US" dirty="0" err="1" smtClean="0"/>
@@ -19307,7 +19620,6 @@
               <a:rPr lang="en-US" dirty="0" smtClean="0"/>
               <a:t> to share and collaborate on projects</a:t>
             </a:r>
-            <a:endParaRPr lang="en-US" dirty="0" smtClean="0"/>
           </a:p>
           <a:p>
             <a:pPr lvl="1"/>
@@ -19438,13 +19750,23 @@
             </a:pPr>
             <a:r>
               <a:rPr lang="en-US" dirty="0" smtClean="0"/>
-              <a:t>Create a new </a:t>
-            </a:r>
+              <a:t>Create a new folder/directory</a:t>
+            </a:r>
+          </a:p>
+          <a:p>
+            <a:pPr marL="0" indent="0">
+              <a:buNone/>
+            </a:pPr>
+            <a:endParaRPr lang="en-US" dirty="0"/>
+          </a:p>
+          <a:p>
+            <a:pPr marL="0" indent="0">
+              <a:buNone/>
+            </a:pPr>
             <a:r>
               <a:rPr lang="en-US" dirty="0" smtClean="0"/>
-              <a:t>folder/directory</a:t>
-            </a:r>
-            <a:endParaRPr lang="en-US" dirty="0" smtClean="0"/>
+              <a:t>Make two new files and put them in your new folder</a:t>
+            </a:r>
           </a:p>
           <a:p>
             <a:pPr marL="0" indent="0">
@@ -19458,34 +19780,7 @@
             </a:pPr>
             <a:r>
               <a:rPr lang="en-US" dirty="0" smtClean="0"/>
-              <a:t>Make two new </a:t>
-            </a:r>
-            <a:r>
-              <a:rPr lang="en-US" dirty="0" smtClean="0"/>
-              <a:t>files and </a:t>
-            </a:r>
-            <a:r>
-              <a:rPr lang="en-US" dirty="0" smtClean="0"/>
-              <a:t>put them in your new folder</a:t>
-            </a:r>
-          </a:p>
-          <a:p>
-            <a:pPr marL="0" indent="0">
-              <a:buNone/>
-            </a:pPr>
-            <a:endParaRPr lang="en-US" dirty="0"/>
-          </a:p>
-          <a:p>
-            <a:pPr marL="0" indent="0">
-              <a:buNone/>
-            </a:pPr>
-            <a:r>
-              <a:rPr lang="en-US" dirty="0" smtClean="0"/>
-              <a:t>*you </a:t>
-            </a:r>
-            <a:r>
-              <a:rPr lang="en-US" dirty="0" smtClean="0"/>
-              <a:t>can use html-ipsum.com for </a:t>
+              <a:t>*you can use html-ipsum.com for </a:t>
             </a:r>
             <a:r>
               <a:rPr lang="en-US" dirty="0" err="1" smtClean="0"/>
@@ -19508,13 +19803,8 @@
             </a:pPr>
             <a:r>
               <a:rPr lang="en-US" dirty="0" smtClean="0"/>
-              <a:t>** when we get to the practice part of the class, you will use your real working directory, but for these examples use </a:t>
-            </a:r>
-            <a:r>
-              <a:rPr lang="en-US" dirty="0" smtClean="0"/>
-              <a:t>the one we created here</a:t>
-            </a:r>
-            <a:endParaRPr lang="en-US" dirty="0" smtClean="0"/>
+              <a:t>** when we get to the practice part of the class, you will use your real working directory, but for these examples use the one we created here</a:t>
+            </a:r>
           </a:p>
           <a:p>
             <a:pPr marL="0" indent="0">
@@ -19659,13 +19949,8 @@
             </a:r>
             <a:r>
               <a:rPr lang="en-US" sz="2400" dirty="0" smtClean="0"/>
-              <a:t> </a:t>
-            </a:r>
-            <a:r>
-              <a:rPr lang="en-US" sz="2400" dirty="0" smtClean="0"/>
-              <a:t>Bash ( the command box )</a:t>
-            </a:r>
-            <a:endParaRPr lang="en-US" sz="2400" dirty="0" smtClean="0"/>
+              <a:t> Bash ( the command box )</a:t>
+            </a:r>
           </a:p>
           <a:p>
             <a:pPr marL="0" indent="0">
@@ -19743,15 +20028,7 @@
             </a:r>
             <a:r>
               <a:rPr lang="en-US" sz="2000" dirty="0" smtClean="0"/>
-              <a:t>Vim is </a:t>
-            </a:r>
-            <a:r>
-              <a:rPr lang="en-US" sz="2000" dirty="0" smtClean="0"/>
-              <a:t>usually </a:t>
-            </a:r>
-            <a:r>
-              <a:rPr lang="en-US" sz="2000" dirty="0" smtClean="0"/>
-              <a:t>the default</a:t>
+              <a:t>Vim is usually the default</a:t>
             </a:r>
             <a:endParaRPr lang="en-US" sz="2000" dirty="0"/>
           </a:p>
@@ -19853,15 +20130,57 @@
                   <a:schemeClr val="bg1"/>
                 </a:solidFill>
               </a:rPr>
+              <a:t> --global user.name “Your name here”</a:t>
+            </a:r>
+          </a:p>
+          <a:p>
+            <a:r>
+              <a:rPr lang="en-US" sz="2000" dirty="0" smtClean="0">
+                <a:solidFill>
+                  <a:schemeClr val="bg1"/>
+                </a:solidFill>
+              </a:rPr>
+              <a:t>$ </a:t>
+            </a:r>
+            <a:r>
+              <a:rPr lang="en-US" sz="2000" dirty="0" err="1" smtClean="0">
+                <a:solidFill>
+                  <a:schemeClr val="bg1"/>
+                </a:solidFill>
+              </a:rPr>
+              <a:t>git</a:t>
+            </a:r>
+            <a:r>
+              <a:rPr lang="en-US" sz="2000" dirty="0" smtClean="0">
+                <a:solidFill>
+                  <a:schemeClr val="bg1"/>
+                </a:solidFill>
+              </a:rPr>
               <a:t> </a:t>
             </a:r>
             <a:r>
+              <a:rPr lang="en-US" sz="2000" dirty="0" err="1" smtClean="0">
+                <a:solidFill>
+                  <a:schemeClr val="bg1"/>
+                </a:solidFill>
+              </a:rPr>
+              <a:t>config</a:t>
+            </a:r>
+            <a:r>
               <a:rPr lang="en-US" sz="2000" dirty="0" smtClean="0">
                 <a:solidFill>
                   <a:schemeClr val="bg1"/>
                 </a:solidFill>
               </a:rPr>
-              <a:t>--global </a:t>
+              <a:t> --global </a:t>
+            </a:r>
+            <a:r>
+              <a:rPr lang="en-US" sz="2000" dirty="0" err="1" smtClean="0">
+                <a:solidFill>
+                  <a:schemeClr val="bg1"/>
+                </a:solidFill>
+              </a:rPr>
+              <a:t>user.email</a:t>
             </a:r>
             <a:r>
               <a:rPr lang="en-US" sz="2000" dirty="0" smtClean="0">
@@ -19869,81 +20188,7 @@
                   <a:schemeClr val="bg1"/>
                 </a:solidFill>
               </a:rPr>
-              <a:t>user.name “Your name here”</a:t>
-            </a:r>
-          </a:p>
-          <a:p>
-            <a:r>
-              <a:rPr lang="en-US" sz="2000" dirty="0" smtClean="0">
-                <a:solidFill>
-                  <a:schemeClr val="bg1"/>
-                </a:solidFill>
-              </a:rPr>
-              <a:t>$ </a:t>
-            </a:r>
-            <a:r>
-              <a:rPr lang="en-US" sz="2000" dirty="0" err="1" smtClean="0">
-                <a:solidFill>
-                  <a:schemeClr val="bg1"/>
-                </a:solidFill>
-              </a:rPr>
-              <a:t>git</a:t>
-            </a:r>
-            <a:r>
-              <a:rPr lang="en-US" sz="2000" dirty="0" smtClean="0">
-                <a:solidFill>
-                  <a:schemeClr val="bg1"/>
-                </a:solidFill>
-              </a:rPr>
-              <a:t> </a:t>
-            </a:r>
-            <a:r>
-              <a:rPr lang="en-US" sz="2000" dirty="0" err="1" smtClean="0">
-                <a:solidFill>
-                  <a:schemeClr val="bg1"/>
-                </a:solidFill>
-              </a:rPr>
-              <a:t>config</a:t>
-            </a:r>
-            <a:r>
-              <a:rPr lang="en-US" sz="2000" dirty="0" smtClean="0">
-                <a:solidFill>
-                  <a:schemeClr val="bg1"/>
-                </a:solidFill>
-              </a:rPr>
-              <a:t> </a:t>
-            </a:r>
-            <a:r>
-              <a:rPr lang="en-US" sz="2000" dirty="0" smtClean="0">
-                <a:solidFill>
-                  <a:schemeClr val="bg1"/>
-                </a:solidFill>
-              </a:rPr>
-              <a:t>--global </a:t>
-            </a:r>
-            <a:r>
-              <a:rPr lang="en-US" sz="2000" dirty="0" err="1" smtClean="0">
-                <a:solidFill>
-                  <a:schemeClr val="bg1"/>
-                </a:solidFill>
-              </a:rPr>
-              <a:t>user.email</a:t>
-            </a:r>
-            <a:r>
-              <a:rPr lang="en-US" sz="2000" dirty="0" smtClean="0">
-                <a:solidFill>
-                  <a:schemeClr val="bg1"/>
-                </a:solidFill>
-              </a:rPr>
-              <a:t> </a:t>
-            </a:r>
-            <a:r>
-              <a:rPr lang="en-US" sz="2000" dirty="0" smtClean="0">
-                <a:solidFill>
-                  <a:schemeClr val="bg1"/>
-                </a:solidFill>
-              </a:rPr>
-              <a:t> </a:t>
+              <a:t>  </a:t>
             </a:r>
             <a:r>
               <a:rPr lang="en-US" sz="2000" dirty="0" err="1" smtClean="0">
@@ -20101,15 +20346,7 @@
                   <a:schemeClr val="bg1"/>
                 </a:solidFill>
               </a:rPr>
-              <a:t> </a:t>
-            </a:r>
-            <a:r>
-              <a:rPr lang="en-US" sz="2000" dirty="0" smtClean="0">
-                <a:solidFill>
-                  <a:schemeClr val="bg1"/>
-                </a:solidFill>
-              </a:rPr>
-              <a:t>--global </a:t>
+              <a:t> --global </a:t>
             </a:r>
             <a:r>
               <a:rPr lang="en-US" sz="2000" dirty="0" err="1" smtClean="0">
@@ -20262,7 +20499,6 @@
               <a:rPr lang="en-US" sz="2400" dirty="0" smtClean="0"/>
               <a:t>directory</a:t>
             </a:r>
-            <a:endParaRPr lang="en-US" sz="2400" dirty="0" smtClean="0"/>
           </a:p>
           <a:p>
             <a:pPr marL="0" indent="0">
@@ -20274,11 +20510,7 @@
             </a:r>
             <a:r>
               <a:rPr lang="en-US" sz="2400" dirty="0" smtClean="0"/>
-              <a:t>cd  &lt;</a:t>
-            </a:r>
-            <a:r>
-              <a:rPr lang="en-US" sz="2400" dirty="0" smtClean="0"/>
-              <a:t>path to directory&gt; =&gt; change directory</a:t>
+              <a:t>cd  &lt;path to directory&gt; =&gt; change directory</a:t>
             </a:r>
           </a:p>
           <a:p>
@@ -20295,11 +20527,7 @@
             </a:r>
             <a:r>
               <a:rPr lang="en-US" sz="2400" dirty="0" smtClean="0"/>
-              <a:t> </a:t>
-            </a:r>
-            <a:r>
-              <a:rPr lang="en-US" sz="2400" dirty="0" smtClean="0"/>
-              <a:t>=&gt; make directory (makes a new folder in your current folder</a:t>
+              <a:t> =&gt; make directory (makes a new folder in your current folder</a:t>
             </a:r>
             <a:r>
               <a:rPr lang="en-US" sz="2000" dirty="0" smtClean="0"/>
@@ -20583,11 +20811,7 @@
             </a:pPr>
             <a:r>
               <a:rPr lang="en-US" sz="3200" b="1" dirty="0" smtClean="0"/>
-              <a:t>Look </a:t>
-            </a:r>
-            <a:r>
-              <a:rPr lang="en-US" sz="3200" b="1" dirty="0" smtClean="0"/>
-              <a:t>into our new repository</a:t>
+              <a:t>Look into our new repository</a:t>
             </a:r>
           </a:p>
           <a:p>

</xml_diff>